<commit_message>
v2.1: misc changes for cycle1 interview round 2
</commit_message>
<xml_diff>
--- a/HANDS/trunk/data/Design.pptx
+++ b/HANDS/trunk/data/Design.pptx
@@ -147,7 +147,7 @@
           <a:p>
             <a:fld id="{46B0DD1D-ED37-4907-8AD7-C556D0397C4A}" type="datetimeFigureOut">
               <a:rPr lang="en-US" smtClean="0"/>
-              <a:t>3/12/2012</a:t>
+              <a:t>3/16/2012</a:t>
             </a:fld>
             <a:endParaRPr lang="en-US"/>
           </a:p>
@@ -303,7 +303,7 @@
           <a:p>
             <a:fld id="{46B0DD1D-ED37-4907-8AD7-C556D0397C4A}" type="datetimeFigureOut">
               <a:rPr lang="en-US" smtClean="0"/>
-              <a:t>3/12/2012</a:t>
+              <a:t>3/16/2012</a:t>
             </a:fld>
             <a:endParaRPr lang="en-US"/>
           </a:p>
@@ -1295,7 +1295,7 @@
           <a:p>
             <a:fld id="{46B0DD1D-ED37-4907-8AD7-C556D0397C4A}" type="datetimeFigureOut">
               <a:rPr lang="en-US" smtClean="0"/>
-              <a:t>3/12/2012</a:t>
+              <a:t>3/16/2012</a:t>
             </a:fld>
             <a:endParaRPr lang="en-US"/>
           </a:p>
@@ -2040,7 +2040,7 @@
           <a:p>
             <a:fld id="{46B0DD1D-ED37-4907-8AD7-C556D0397C4A}" type="datetimeFigureOut">
               <a:rPr lang="en-US" smtClean="0"/>
-              <a:t>3/12/2012</a:t>
+              <a:t>3/16/2012</a:t>
             </a:fld>
             <a:endParaRPr lang="en-US"/>
           </a:p>
@@ -2421,17 +2421,20 @@
           <a:prstGeom prst="line">
             <a:avLst/>
           </a:prstGeom>
-          <a:ln w="38100"/>
+          <a:ln>
+            <a:headEnd type="oval"/>
+            <a:tailEnd type="oval"/>
+          </a:ln>
         </p:spPr>
         <p:style>
-          <a:lnRef idx="1">
-            <a:schemeClr val="accent1"/>
+          <a:lnRef idx="3">
+            <a:schemeClr val="dk1"/>
           </a:lnRef>
           <a:fillRef idx="0">
-            <a:schemeClr val="accent1"/>
+            <a:schemeClr val="dk1"/>
           </a:fillRef>
-          <a:effectRef idx="0">
-            <a:schemeClr val="accent1"/>
+          <a:effectRef idx="2">
+            <a:schemeClr val="dk1"/>
           </a:effectRef>
           <a:fontRef idx="minor">
             <a:schemeClr val="tx1"/>
@@ -2452,17 +2455,20 @@
           <a:prstGeom prst="line">
             <a:avLst/>
           </a:prstGeom>
-          <a:ln w="38100"/>
+          <a:ln>
+            <a:headEnd type="oval"/>
+            <a:tailEnd type="oval"/>
+          </a:ln>
         </p:spPr>
         <p:style>
-          <a:lnRef idx="1">
-            <a:schemeClr val="accent1"/>
+          <a:lnRef idx="3">
+            <a:schemeClr val="dk1"/>
           </a:lnRef>
           <a:fillRef idx="0">
-            <a:schemeClr val="accent1"/>
+            <a:schemeClr val="dk1"/>
           </a:fillRef>
-          <a:effectRef idx="0">
-            <a:schemeClr val="accent1"/>
+          <a:effectRef idx="2">
+            <a:schemeClr val="dk1"/>
           </a:effectRef>
           <a:fontRef idx="minor">
             <a:schemeClr val="tx1"/>
@@ -2483,19 +2489,21 @@
           <a:prstGeom prst="line">
             <a:avLst/>
           </a:prstGeom>
-          <a:ln w="38100">
+          <a:ln>
             <a:prstDash val="sysDot"/>
+            <a:headEnd type="oval"/>
+            <a:tailEnd type="oval"/>
           </a:ln>
         </p:spPr>
         <p:style>
-          <a:lnRef idx="1">
-            <a:schemeClr val="accent1"/>
+          <a:lnRef idx="3">
+            <a:schemeClr val="dk1"/>
           </a:lnRef>
           <a:fillRef idx="0">
-            <a:schemeClr val="accent1"/>
+            <a:schemeClr val="dk1"/>
           </a:fillRef>
-          <a:effectRef idx="0">
-            <a:schemeClr val="accent1"/>
+          <a:effectRef idx="2">
+            <a:schemeClr val="dk1"/>
           </a:effectRef>
           <a:fontRef idx="minor">
             <a:schemeClr val="tx1"/>
@@ -2516,19 +2524,21 @@
           <a:prstGeom prst="line">
             <a:avLst/>
           </a:prstGeom>
-          <a:ln w="38100">
+          <a:ln>
             <a:prstDash val="sysDot"/>
+            <a:headEnd type="oval"/>
+            <a:tailEnd type="oval"/>
           </a:ln>
         </p:spPr>
         <p:style>
-          <a:lnRef idx="1">
-            <a:schemeClr val="accent1"/>
+          <a:lnRef idx="3">
+            <a:schemeClr val="dk1"/>
           </a:lnRef>
           <a:fillRef idx="0">
-            <a:schemeClr val="accent1"/>
+            <a:schemeClr val="dk1"/>
           </a:fillRef>
-          <a:effectRef idx="0">
-            <a:schemeClr val="accent1"/>
+          <a:effectRef idx="2">
+            <a:schemeClr val="dk1"/>
           </a:effectRef>
           <a:fontRef idx="minor">
             <a:schemeClr val="tx1"/>
@@ -2543,25 +2553,27 @@
         </p:nvCxnSpPr>
         <p:spPr>
           <a:xfrm flipV="1">
-            <a:off x="5189041" y="3407251"/>
-            <a:ext cx="518160" cy="361950"/>
+            <a:off x="5204460" y="3407251"/>
+            <a:ext cx="502741" cy="361950"/>
           </a:xfrm>
           <a:prstGeom prst="line">
             <a:avLst/>
           </a:prstGeom>
-          <a:ln w="38100">
+          <a:ln>
             <a:prstDash val="sysDot"/>
+            <a:headEnd type="oval"/>
+            <a:tailEnd type="oval"/>
           </a:ln>
         </p:spPr>
         <p:style>
-          <a:lnRef idx="1">
-            <a:schemeClr val="accent1"/>
+          <a:lnRef idx="3">
+            <a:schemeClr val="dk1"/>
           </a:lnRef>
           <a:fillRef idx="0">
-            <a:schemeClr val="accent1"/>
+            <a:schemeClr val="dk1"/>
           </a:fillRef>
-          <a:effectRef idx="0">
-            <a:schemeClr val="accent1"/>
+          <a:effectRef idx="2">
+            <a:schemeClr val="dk1"/>
           </a:effectRef>
           <a:fontRef idx="minor">
             <a:schemeClr val="tx1"/>
@@ -2582,19 +2594,21 @@
           <a:prstGeom prst="line">
             <a:avLst/>
           </a:prstGeom>
-          <a:ln w="38100">
+          <a:ln>
             <a:prstDash val="sysDot"/>
+            <a:headEnd type="oval"/>
+            <a:tailEnd type="oval"/>
           </a:ln>
         </p:spPr>
         <p:style>
-          <a:lnRef idx="1">
-            <a:schemeClr val="accent1"/>
+          <a:lnRef idx="3">
+            <a:schemeClr val="dk1"/>
           </a:lnRef>
           <a:fillRef idx="0">
-            <a:schemeClr val="accent1"/>
+            <a:schemeClr val="dk1"/>
           </a:fillRef>
-          <a:effectRef idx="0">
-            <a:schemeClr val="accent1"/>
+          <a:effectRef idx="2">
+            <a:schemeClr val="dk1"/>
           </a:effectRef>
           <a:fontRef idx="minor">
             <a:schemeClr val="tx1"/>
@@ -2620,14 +2634,14 @@
           </a:ln>
         </p:spPr>
         <p:style>
-          <a:lnRef idx="3">
-            <a:schemeClr val="accent2"/>
+          <a:lnRef idx="2">
+            <a:schemeClr val="accent1"/>
           </a:lnRef>
           <a:fillRef idx="0">
-            <a:schemeClr val="accent2"/>
+            <a:schemeClr val="accent1"/>
           </a:fillRef>
-          <a:effectRef idx="2">
-            <a:schemeClr val="accent2"/>
+          <a:effectRef idx="1">
+            <a:schemeClr val="accent1"/>
           </a:effectRef>
           <a:fontRef idx="minor">
             <a:schemeClr val="tx1"/>
@@ -2642,7 +2656,7 @@
         </p:nvSpPr>
         <p:spPr>
           <a:xfrm>
-            <a:off x="4186995" y="2522097"/>
+            <a:off x="4153654" y="2522097"/>
             <a:ext cx="633761" cy="215444"/>
           </a:xfrm>
           <a:prstGeom prst="rect">
@@ -2669,847 +2683,6 @@
               <a:ea typeface="Tahoma" pitchFamily="34" charset="0"/>
               <a:cs typeface="Tahoma" pitchFamily="34" charset="0"/>
             </a:endParaRPr>
-          </a:p>
-        </p:txBody>
-      </p:sp>
-      <p:sp>
-        <p:nvSpPr>
-          <p:cNvPr id="12" name="Rectangle 1"/>
-          <p:cNvSpPr/>
-          <p:nvPr/>
-        </p:nvSpPr>
-        <p:spPr>
-          <a:xfrm>
-            <a:off x="4201459" y="2844657"/>
-            <a:ext cx="2087585" cy="965343"/>
-          </a:xfrm>
-          <a:custGeom>
-            <a:avLst/>
-            <a:gdLst>
-              <a:gd name="connsiteX0" fmla="*/ 0 w 1545627"/>
-              <a:gd name="connsiteY0" fmla="*/ 0 h 912461"/>
-              <a:gd name="connsiteX1" fmla="*/ 1545627 w 1545627"/>
-              <a:gd name="connsiteY1" fmla="*/ 0 h 912461"/>
-              <a:gd name="connsiteX2" fmla="*/ 1545627 w 1545627"/>
-              <a:gd name="connsiteY2" fmla="*/ 912461 h 912461"/>
-              <a:gd name="connsiteX3" fmla="*/ 0 w 1545627"/>
-              <a:gd name="connsiteY3" fmla="*/ 912461 h 912461"/>
-              <a:gd name="connsiteX4" fmla="*/ 0 w 1545627"/>
-              <a:gd name="connsiteY4" fmla="*/ 0 h 912461"/>
-              <a:gd name="connsiteX0" fmla="*/ 0 w 1545627"/>
-              <a:gd name="connsiteY0" fmla="*/ 2 h 912463"/>
-              <a:gd name="connsiteX1" fmla="*/ 445981 w 1545627"/>
-              <a:gd name="connsiteY1" fmla="*/ 726585 h 912463"/>
-              <a:gd name="connsiteX2" fmla="*/ 1545627 w 1545627"/>
-              <a:gd name="connsiteY2" fmla="*/ 2 h 912463"/>
-              <a:gd name="connsiteX3" fmla="*/ 1545627 w 1545627"/>
-              <a:gd name="connsiteY3" fmla="*/ 912463 h 912463"/>
-              <a:gd name="connsiteX4" fmla="*/ 0 w 1545627"/>
-              <a:gd name="connsiteY4" fmla="*/ 912463 h 912463"/>
-              <a:gd name="connsiteX5" fmla="*/ 0 w 1545627"/>
-              <a:gd name="connsiteY5" fmla="*/ 2 h 912463"/>
-              <a:gd name="connsiteX0" fmla="*/ 25400 w 1571027"/>
-              <a:gd name="connsiteY0" fmla="*/ 2 h 912463"/>
-              <a:gd name="connsiteX1" fmla="*/ 471381 w 1571027"/>
-              <a:gd name="connsiteY1" fmla="*/ 726585 h 912463"/>
-              <a:gd name="connsiteX2" fmla="*/ 1571027 w 1571027"/>
-              <a:gd name="connsiteY2" fmla="*/ 2 h 912463"/>
-              <a:gd name="connsiteX3" fmla="*/ 1571027 w 1571027"/>
-              <a:gd name="connsiteY3" fmla="*/ 912463 h 912463"/>
-              <a:gd name="connsiteX4" fmla="*/ 0 w 1571027"/>
-              <a:gd name="connsiteY4" fmla="*/ 744823 h 912463"/>
-              <a:gd name="connsiteX5" fmla="*/ 25400 w 1571027"/>
-              <a:gd name="connsiteY5" fmla="*/ 2 h 912463"/>
-              <a:gd name="connsiteX0" fmla="*/ 5080 w 1571027"/>
-              <a:gd name="connsiteY0" fmla="*/ 721360 h 912461"/>
-              <a:gd name="connsiteX1" fmla="*/ 471381 w 1571027"/>
-              <a:gd name="connsiteY1" fmla="*/ 726583 h 912461"/>
-              <a:gd name="connsiteX2" fmla="*/ 1571027 w 1571027"/>
-              <a:gd name="connsiteY2" fmla="*/ 0 h 912461"/>
-              <a:gd name="connsiteX3" fmla="*/ 1571027 w 1571027"/>
-              <a:gd name="connsiteY3" fmla="*/ 912461 h 912461"/>
-              <a:gd name="connsiteX4" fmla="*/ 0 w 1571027"/>
-              <a:gd name="connsiteY4" fmla="*/ 744821 h 912461"/>
-              <a:gd name="connsiteX5" fmla="*/ 5080 w 1571027"/>
-              <a:gd name="connsiteY5" fmla="*/ 721360 h 912461"/>
-              <a:gd name="connsiteX0" fmla="*/ 5080 w 1571027"/>
-              <a:gd name="connsiteY0" fmla="*/ 721360 h 943829"/>
-              <a:gd name="connsiteX1" fmla="*/ 471381 w 1571027"/>
-              <a:gd name="connsiteY1" fmla="*/ 726583 h 943829"/>
-              <a:gd name="connsiteX2" fmla="*/ 1571027 w 1571027"/>
-              <a:gd name="connsiteY2" fmla="*/ 0 h 943829"/>
-              <a:gd name="connsiteX3" fmla="*/ 1571027 w 1571027"/>
-              <a:gd name="connsiteY3" fmla="*/ 912461 h 943829"/>
-              <a:gd name="connsiteX4" fmla="*/ 471381 w 1571027"/>
-              <a:gd name="connsiteY4" fmla="*/ 934863 h 943829"/>
-              <a:gd name="connsiteX5" fmla="*/ 0 w 1571027"/>
-              <a:gd name="connsiteY5" fmla="*/ 744821 h 943829"/>
-              <a:gd name="connsiteX6" fmla="*/ 5080 w 1571027"/>
-              <a:gd name="connsiteY6" fmla="*/ 721360 h 943829"/>
-              <a:gd name="connsiteX0" fmla="*/ 5080 w 1571027"/>
-              <a:gd name="connsiteY0" fmla="*/ 721360 h 943829"/>
-              <a:gd name="connsiteX1" fmla="*/ 481541 w 1571027"/>
-              <a:gd name="connsiteY1" fmla="*/ 812943 h 943829"/>
-              <a:gd name="connsiteX2" fmla="*/ 1571027 w 1571027"/>
-              <a:gd name="connsiteY2" fmla="*/ 0 h 943829"/>
-              <a:gd name="connsiteX3" fmla="*/ 1571027 w 1571027"/>
-              <a:gd name="connsiteY3" fmla="*/ 912461 h 943829"/>
-              <a:gd name="connsiteX4" fmla="*/ 471381 w 1571027"/>
-              <a:gd name="connsiteY4" fmla="*/ 934863 h 943829"/>
-              <a:gd name="connsiteX5" fmla="*/ 0 w 1571027"/>
-              <a:gd name="connsiteY5" fmla="*/ 744821 h 943829"/>
-              <a:gd name="connsiteX6" fmla="*/ 5080 w 1571027"/>
-              <a:gd name="connsiteY6" fmla="*/ 721360 h 943829"/>
-              <a:gd name="connsiteX0" fmla="*/ 5080 w 1571027"/>
-              <a:gd name="connsiteY0" fmla="*/ 721360 h 954436"/>
-              <a:gd name="connsiteX1" fmla="*/ 481541 w 1571027"/>
-              <a:gd name="connsiteY1" fmla="*/ 812943 h 954436"/>
-              <a:gd name="connsiteX2" fmla="*/ 1571027 w 1571027"/>
-              <a:gd name="connsiteY2" fmla="*/ 0 h 954436"/>
-              <a:gd name="connsiteX3" fmla="*/ 1571027 w 1571027"/>
-              <a:gd name="connsiteY3" fmla="*/ 912461 h 954436"/>
-              <a:gd name="connsiteX4" fmla="*/ 1035261 w 1571027"/>
-              <a:gd name="connsiteY4" fmla="*/ 746903 h 954436"/>
-              <a:gd name="connsiteX5" fmla="*/ 471381 w 1571027"/>
-              <a:gd name="connsiteY5" fmla="*/ 934863 h 954436"/>
-              <a:gd name="connsiteX6" fmla="*/ 0 w 1571027"/>
-              <a:gd name="connsiteY6" fmla="*/ 744821 h 954436"/>
-              <a:gd name="connsiteX7" fmla="*/ 5080 w 1571027"/>
-              <a:gd name="connsiteY7" fmla="*/ 721360 h 954436"/>
-              <a:gd name="connsiteX0" fmla="*/ 5080 w 1571027"/>
-              <a:gd name="connsiteY0" fmla="*/ 721360 h 943223"/>
-              <a:gd name="connsiteX1" fmla="*/ 481541 w 1571027"/>
-              <a:gd name="connsiteY1" fmla="*/ 812943 h 943223"/>
-              <a:gd name="connsiteX2" fmla="*/ 1571027 w 1571027"/>
-              <a:gd name="connsiteY2" fmla="*/ 0 h 943223"/>
-              <a:gd name="connsiteX3" fmla="*/ 1571027 w 1571027"/>
-              <a:gd name="connsiteY3" fmla="*/ 912461 h 943223"/>
-              <a:gd name="connsiteX4" fmla="*/ 1035261 w 1571027"/>
-              <a:gd name="connsiteY4" fmla="*/ 746903 h 943223"/>
-              <a:gd name="connsiteX5" fmla="*/ 471381 w 1571027"/>
-              <a:gd name="connsiteY5" fmla="*/ 934863 h 943223"/>
-              <a:gd name="connsiteX6" fmla="*/ 0 w 1571027"/>
-              <a:gd name="connsiteY6" fmla="*/ 744821 h 943223"/>
-              <a:gd name="connsiteX7" fmla="*/ 5080 w 1571027"/>
-              <a:gd name="connsiteY7" fmla="*/ 721360 h 943223"/>
-              <a:gd name="connsiteX0" fmla="*/ 5080 w 1571027"/>
-              <a:gd name="connsiteY0" fmla="*/ 721360 h 951309"/>
-              <a:gd name="connsiteX1" fmla="*/ 481541 w 1571027"/>
-              <a:gd name="connsiteY1" fmla="*/ 812943 h 951309"/>
-              <a:gd name="connsiteX2" fmla="*/ 1571027 w 1571027"/>
-              <a:gd name="connsiteY2" fmla="*/ 0 h 951309"/>
-              <a:gd name="connsiteX3" fmla="*/ 1571027 w 1571027"/>
-              <a:gd name="connsiteY3" fmla="*/ 912461 h 951309"/>
-              <a:gd name="connsiteX4" fmla="*/ 1035261 w 1571027"/>
-              <a:gd name="connsiteY4" fmla="*/ 746903 h 951309"/>
-              <a:gd name="connsiteX5" fmla="*/ 471381 w 1571027"/>
-              <a:gd name="connsiteY5" fmla="*/ 934863 h 951309"/>
-              <a:gd name="connsiteX6" fmla="*/ 0 w 1571027"/>
-              <a:gd name="connsiteY6" fmla="*/ 744821 h 951309"/>
-              <a:gd name="connsiteX7" fmla="*/ 5080 w 1571027"/>
-              <a:gd name="connsiteY7" fmla="*/ 721360 h 951309"/>
-              <a:gd name="connsiteX0" fmla="*/ 5080 w 1571027"/>
-              <a:gd name="connsiteY0" fmla="*/ 721360 h 951309"/>
-              <a:gd name="connsiteX1" fmla="*/ 481541 w 1571027"/>
-              <a:gd name="connsiteY1" fmla="*/ 812943 h 951309"/>
-              <a:gd name="connsiteX2" fmla="*/ 1571027 w 1571027"/>
-              <a:gd name="connsiteY2" fmla="*/ 0 h 951309"/>
-              <a:gd name="connsiteX3" fmla="*/ 1571027 w 1571027"/>
-              <a:gd name="connsiteY3" fmla="*/ 912461 h 951309"/>
-              <a:gd name="connsiteX4" fmla="*/ 1035261 w 1571027"/>
-              <a:gd name="connsiteY4" fmla="*/ 746903 h 951309"/>
-              <a:gd name="connsiteX5" fmla="*/ 471381 w 1571027"/>
-              <a:gd name="connsiteY5" fmla="*/ 934863 h 951309"/>
-              <a:gd name="connsiteX6" fmla="*/ 0 w 1571027"/>
-              <a:gd name="connsiteY6" fmla="*/ 744821 h 951309"/>
-              <a:gd name="connsiteX7" fmla="*/ 5080 w 1571027"/>
-              <a:gd name="connsiteY7" fmla="*/ 721360 h 951309"/>
-              <a:gd name="connsiteX0" fmla="*/ 5080 w 1571027"/>
-              <a:gd name="connsiteY0" fmla="*/ 721360 h 944817"/>
-              <a:gd name="connsiteX1" fmla="*/ 481541 w 1571027"/>
-              <a:gd name="connsiteY1" fmla="*/ 812943 h 944817"/>
-              <a:gd name="connsiteX2" fmla="*/ 1571027 w 1571027"/>
-              <a:gd name="connsiteY2" fmla="*/ 0 h 944817"/>
-              <a:gd name="connsiteX3" fmla="*/ 1571027 w 1571027"/>
-              <a:gd name="connsiteY3" fmla="*/ 912461 h 944817"/>
-              <a:gd name="connsiteX4" fmla="*/ 1035261 w 1571027"/>
-              <a:gd name="connsiteY4" fmla="*/ 746903 h 944817"/>
-              <a:gd name="connsiteX5" fmla="*/ 471381 w 1571027"/>
-              <a:gd name="connsiteY5" fmla="*/ 934863 h 944817"/>
-              <a:gd name="connsiteX6" fmla="*/ 0 w 1571027"/>
-              <a:gd name="connsiteY6" fmla="*/ 744821 h 944817"/>
-              <a:gd name="connsiteX7" fmla="*/ 5080 w 1571027"/>
-              <a:gd name="connsiteY7" fmla="*/ 721360 h 944817"/>
-              <a:gd name="connsiteX0" fmla="*/ 62414 w 1628361"/>
-              <a:gd name="connsiteY0" fmla="*/ 721360 h 944817"/>
-              <a:gd name="connsiteX1" fmla="*/ 538875 w 1628361"/>
-              <a:gd name="connsiteY1" fmla="*/ 812943 h 944817"/>
-              <a:gd name="connsiteX2" fmla="*/ 1628361 w 1628361"/>
-              <a:gd name="connsiteY2" fmla="*/ 0 h 944817"/>
-              <a:gd name="connsiteX3" fmla="*/ 1628361 w 1628361"/>
-              <a:gd name="connsiteY3" fmla="*/ 912461 h 944817"/>
-              <a:gd name="connsiteX4" fmla="*/ 1092595 w 1628361"/>
-              <a:gd name="connsiteY4" fmla="*/ 746903 h 944817"/>
-              <a:gd name="connsiteX5" fmla="*/ 528715 w 1628361"/>
-              <a:gd name="connsiteY5" fmla="*/ 934863 h 944817"/>
-              <a:gd name="connsiteX6" fmla="*/ 57334 w 1628361"/>
-              <a:gd name="connsiteY6" fmla="*/ 744821 h 944817"/>
-              <a:gd name="connsiteX7" fmla="*/ 62414 w 1628361"/>
-              <a:gd name="connsiteY7" fmla="*/ 721360 h 944817"/>
-              <a:gd name="connsiteX0" fmla="*/ 62414 w 1732734"/>
-              <a:gd name="connsiteY0" fmla="*/ 721360 h 944817"/>
-              <a:gd name="connsiteX1" fmla="*/ 538875 w 1732734"/>
-              <a:gd name="connsiteY1" fmla="*/ 812943 h 944817"/>
-              <a:gd name="connsiteX2" fmla="*/ 1628361 w 1732734"/>
-              <a:gd name="connsiteY2" fmla="*/ 0 h 944817"/>
-              <a:gd name="connsiteX3" fmla="*/ 1628361 w 1732734"/>
-              <a:gd name="connsiteY3" fmla="*/ 912461 h 944817"/>
-              <a:gd name="connsiteX4" fmla="*/ 1092595 w 1732734"/>
-              <a:gd name="connsiteY4" fmla="*/ 746903 h 944817"/>
-              <a:gd name="connsiteX5" fmla="*/ 528715 w 1732734"/>
-              <a:gd name="connsiteY5" fmla="*/ 934863 h 944817"/>
-              <a:gd name="connsiteX6" fmla="*/ 57334 w 1732734"/>
-              <a:gd name="connsiteY6" fmla="*/ 744821 h 944817"/>
-              <a:gd name="connsiteX7" fmla="*/ 62414 w 1732734"/>
-              <a:gd name="connsiteY7" fmla="*/ 721360 h 944817"/>
-              <a:gd name="connsiteX0" fmla="*/ 62414 w 1732734"/>
-              <a:gd name="connsiteY0" fmla="*/ 721360 h 944817"/>
-              <a:gd name="connsiteX1" fmla="*/ 538875 w 1732734"/>
-              <a:gd name="connsiteY1" fmla="*/ 812943 h 944817"/>
-              <a:gd name="connsiteX2" fmla="*/ 1628361 w 1732734"/>
-              <a:gd name="connsiteY2" fmla="*/ 0 h 944817"/>
-              <a:gd name="connsiteX3" fmla="*/ 1628361 w 1732734"/>
-              <a:gd name="connsiteY3" fmla="*/ 912461 h 944817"/>
-              <a:gd name="connsiteX4" fmla="*/ 1092595 w 1732734"/>
-              <a:gd name="connsiteY4" fmla="*/ 746903 h 944817"/>
-              <a:gd name="connsiteX5" fmla="*/ 528715 w 1732734"/>
-              <a:gd name="connsiteY5" fmla="*/ 934863 h 944817"/>
-              <a:gd name="connsiteX6" fmla="*/ 57334 w 1732734"/>
-              <a:gd name="connsiteY6" fmla="*/ 744821 h 944817"/>
-              <a:gd name="connsiteX7" fmla="*/ 62414 w 1732734"/>
-              <a:gd name="connsiteY7" fmla="*/ 721360 h 944817"/>
-              <a:gd name="connsiteX0" fmla="*/ 62414 w 1709063"/>
-              <a:gd name="connsiteY0" fmla="*/ 721360 h 944817"/>
-              <a:gd name="connsiteX1" fmla="*/ 538875 w 1709063"/>
-              <a:gd name="connsiteY1" fmla="*/ 812943 h 944817"/>
-              <a:gd name="connsiteX2" fmla="*/ 1628361 w 1709063"/>
-              <a:gd name="connsiteY2" fmla="*/ 0 h 944817"/>
-              <a:gd name="connsiteX3" fmla="*/ 1628361 w 1709063"/>
-              <a:gd name="connsiteY3" fmla="*/ 912461 h 944817"/>
-              <a:gd name="connsiteX4" fmla="*/ 1092595 w 1709063"/>
-              <a:gd name="connsiteY4" fmla="*/ 746903 h 944817"/>
-              <a:gd name="connsiteX5" fmla="*/ 528715 w 1709063"/>
-              <a:gd name="connsiteY5" fmla="*/ 934863 h 944817"/>
-              <a:gd name="connsiteX6" fmla="*/ 57334 w 1709063"/>
-              <a:gd name="connsiteY6" fmla="*/ 744821 h 944817"/>
-              <a:gd name="connsiteX7" fmla="*/ 62414 w 1709063"/>
-              <a:gd name="connsiteY7" fmla="*/ 721360 h 944817"/>
-              <a:gd name="connsiteX0" fmla="*/ 62414 w 1709063"/>
-              <a:gd name="connsiteY0" fmla="*/ 721360 h 944817"/>
-              <a:gd name="connsiteX1" fmla="*/ 538875 w 1709063"/>
-              <a:gd name="connsiteY1" fmla="*/ 812943 h 944817"/>
-              <a:gd name="connsiteX2" fmla="*/ 1628361 w 1709063"/>
-              <a:gd name="connsiteY2" fmla="*/ 0 h 944817"/>
-              <a:gd name="connsiteX3" fmla="*/ 1628361 w 1709063"/>
-              <a:gd name="connsiteY3" fmla="*/ 912461 h 944817"/>
-              <a:gd name="connsiteX4" fmla="*/ 1092595 w 1709063"/>
-              <a:gd name="connsiteY4" fmla="*/ 746903 h 944817"/>
-              <a:gd name="connsiteX5" fmla="*/ 528715 w 1709063"/>
-              <a:gd name="connsiteY5" fmla="*/ 934863 h 944817"/>
-              <a:gd name="connsiteX6" fmla="*/ 57334 w 1709063"/>
-              <a:gd name="connsiteY6" fmla="*/ 744821 h 944817"/>
-              <a:gd name="connsiteX7" fmla="*/ 62414 w 1709063"/>
-              <a:gd name="connsiteY7" fmla="*/ 721360 h 944817"/>
-              <a:gd name="connsiteX0" fmla="*/ 62414 w 1630041"/>
-              <a:gd name="connsiteY0" fmla="*/ 721360 h 944817"/>
-              <a:gd name="connsiteX1" fmla="*/ 538875 w 1630041"/>
-              <a:gd name="connsiteY1" fmla="*/ 812943 h 944817"/>
-              <a:gd name="connsiteX2" fmla="*/ 1628361 w 1630041"/>
-              <a:gd name="connsiteY2" fmla="*/ 0 h 944817"/>
-              <a:gd name="connsiteX3" fmla="*/ 1628361 w 1630041"/>
-              <a:gd name="connsiteY3" fmla="*/ 912461 h 944817"/>
-              <a:gd name="connsiteX4" fmla="*/ 1092595 w 1630041"/>
-              <a:gd name="connsiteY4" fmla="*/ 746903 h 944817"/>
-              <a:gd name="connsiteX5" fmla="*/ 528715 w 1630041"/>
-              <a:gd name="connsiteY5" fmla="*/ 934863 h 944817"/>
-              <a:gd name="connsiteX6" fmla="*/ 57334 w 1630041"/>
-              <a:gd name="connsiteY6" fmla="*/ 744821 h 944817"/>
-              <a:gd name="connsiteX7" fmla="*/ 62414 w 1630041"/>
-              <a:gd name="connsiteY7" fmla="*/ 721360 h 944817"/>
-              <a:gd name="connsiteX0" fmla="*/ 62414 w 1630041"/>
-              <a:gd name="connsiteY0" fmla="*/ 721360 h 944817"/>
-              <a:gd name="connsiteX1" fmla="*/ 538875 w 1630041"/>
-              <a:gd name="connsiteY1" fmla="*/ 812943 h 944817"/>
-              <a:gd name="connsiteX2" fmla="*/ 1021475 w 1630041"/>
-              <a:gd name="connsiteY2" fmla="*/ 391303 h 944817"/>
-              <a:gd name="connsiteX3" fmla="*/ 1628361 w 1630041"/>
-              <a:gd name="connsiteY3" fmla="*/ 0 h 944817"/>
-              <a:gd name="connsiteX4" fmla="*/ 1628361 w 1630041"/>
-              <a:gd name="connsiteY4" fmla="*/ 912461 h 944817"/>
-              <a:gd name="connsiteX5" fmla="*/ 1092595 w 1630041"/>
-              <a:gd name="connsiteY5" fmla="*/ 746903 h 944817"/>
-              <a:gd name="connsiteX6" fmla="*/ 528715 w 1630041"/>
-              <a:gd name="connsiteY6" fmla="*/ 934863 h 944817"/>
-              <a:gd name="connsiteX7" fmla="*/ 57334 w 1630041"/>
-              <a:gd name="connsiteY7" fmla="*/ 744821 h 944817"/>
-              <a:gd name="connsiteX8" fmla="*/ 62414 w 1630041"/>
-              <a:gd name="connsiteY8" fmla="*/ 721360 h 944817"/>
-              <a:gd name="connsiteX0" fmla="*/ 62414 w 1633441"/>
-              <a:gd name="connsiteY0" fmla="*/ 721360 h 944817"/>
-              <a:gd name="connsiteX1" fmla="*/ 538875 w 1633441"/>
-              <a:gd name="connsiteY1" fmla="*/ 812943 h 944817"/>
-              <a:gd name="connsiteX2" fmla="*/ 1021475 w 1633441"/>
-              <a:gd name="connsiteY2" fmla="*/ 391303 h 944817"/>
-              <a:gd name="connsiteX3" fmla="*/ 1628361 w 1633441"/>
-              <a:gd name="connsiteY3" fmla="*/ 0 h 944817"/>
-              <a:gd name="connsiteX4" fmla="*/ 1633441 w 1633441"/>
-              <a:gd name="connsiteY4" fmla="*/ 765141 h 944817"/>
-              <a:gd name="connsiteX5" fmla="*/ 1092595 w 1633441"/>
-              <a:gd name="connsiteY5" fmla="*/ 746903 h 944817"/>
-              <a:gd name="connsiteX6" fmla="*/ 528715 w 1633441"/>
-              <a:gd name="connsiteY6" fmla="*/ 934863 h 944817"/>
-              <a:gd name="connsiteX7" fmla="*/ 57334 w 1633441"/>
-              <a:gd name="connsiteY7" fmla="*/ 744821 h 944817"/>
-              <a:gd name="connsiteX8" fmla="*/ 62414 w 1633441"/>
-              <a:gd name="connsiteY8" fmla="*/ 721360 h 944817"/>
-              <a:gd name="connsiteX0" fmla="*/ 62414 w 1633441"/>
-              <a:gd name="connsiteY0" fmla="*/ 721360 h 944817"/>
-              <a:gd name="connsiteX1" fmla="*/ 538875 w 1633441"/>
-              <a:gd name="connsiteY1" fmla="*/ 812943 h 944817"/>
-              <a:gd name="connsiteX2" fmla="*/ 1021475 w 1633441"/>
-              <a:gd name="connsiteY2" fmla="*/ 391303 h 944817"/>
-              <a:gd name="connsiteX3" fmla="*/ 1628361 w 1633441"/>
-              <a:gd name="connsiteY3" fmla="*/ 0 h 944817"/>
-              <a:gd name="connsiteX4" fmla="*/ 1633441 w 1633441"/>
-              <a:gd name="connsiteY4" fmla="*/ 765141 h 944817"/>
-              <a:gd name="connsiteX5" fmla="*/ 1092595 w 1633441"/>
-              <a:gd name="connsiteY5" fmla="*/ 746903 h 944817"/>
-              <a:gd name="connsiteX6" fmla="*/ 528715 w 1633441"/>
-              <a:gd name="connsiteY6" fmla="*/ 934863 h 944817"/>
-              <a:gd name="connsiteX7" fmla="*/ 57334 w 1633441"/>
-              <a:gd name="connsiteY7" fmla="*/ 744821 h 944817"/>
-              <a:gd name="connsiteX8" fmla="*/ 62414 w 1633441"/>
-              <a:gd name="connsiteY8" fmla="*/ 721360 h 944817"/>
-              <a:gd name="connsiteX0" fmla="*/ 62414 w 1638521"/>
-              <a:gd name="connsiteY0" fmla="*/ 721360 h 944817"/>
-              <a:gd name="connsiteX1" fmla="*/ 538875 w 1638521"/>
-              <a:gd name="connsiteY1" fmla="*/ 812943 h 944817"/>
-              <a:gd name="connsiteX2" fmla="*/ 1021475 w 1638521"/>
-              <a:gd name="connsiteY2" fmla="*/ 391303 h 944817"/>
-              <a:gd name="connsiteX3" fmla="*/ 1628361 w 1638521"/>
-              <a:gd name="connsiteY3" fmla="*/ 0 h 944817"/>
-              <a:gd name="connsiteX4" fmla="*/ 1638521 w 1638521"/>
-              <a:gd name="connsiteY4" fmla="*/ 826101 h 944817"/>
-              <a:gd name="connsiteX5" fmla="*/ 1092595 w 1638521"/>
-              <a:gd name="connsiteY5" fmla="*/ 746903 h 944817"/>
-              <a:gd name="connsiteX6" fmla="*/ 528715 w 1638521"/>
-              <a:gd name="connsiteY6" fmla="*/ 934863 h 944817"/>
-              <a:gd name="connsiteX7" fmla="*/ 57334 w 1638521"/>
-              <a:gd name="connsiteY7" fmla="*/ 744821 h 944817"/>
-              <a:gd name="connsiteX8" fmla="*/ 62414 w 1638521"/>
-              <a:gd name="connsiteY8" fmla="*/ 721360 h 944817"/>
-              <a:gd name="connsiteX0" fmla="*/ 62414 w 1638521"/>
-              <a:gd name="connsiteY0" fmla="*/ 721360 h 944817"/>
-              <a:gd name="connsiteX1" fmla="*/ 538875 w 1638521"/>
-              <a:gd name="connsiteY1" fmla="*/ 812943 h 944817"/>
-              <a:gd name="connsiteX2" fmla="*/ 1021475 w 1638521"/>
-              <a:gd name="connsiteY2" fmla="*/ 391303 h 944817"/>
-              <a:gd name="connsiteX3" fmla="*/ 1628361 w 1638521"/>
-              <a:gd name="connsiteY3" fmla="*/ 0 h 944817"/>
-              <a:gd name="connsiteX4" fmla="*/ 1638521 w 1638521"/>
-              <a:gd name="connsiteY4" fmla="*/ 826101 h 944817"/>
-              <a:gd name="connsiteX5" fmla="*/ 1092595 w 1638521"/>
-              <a:gd name="connsiteY5" fmla="*/ 746903 h 944817"/>
-              <a:gd name="connsiteX6" fmla="*/ 528715 w 1638521"/>
-              <a:gd name="connsiteY6" fmla="*/ 934863 h 944817"/>
-              <a:gd name="connsiteX7" fmla="*/ 57334 w 1638521"/>
-              <a:gd name="connsiteY7" fmla="*/ 744821 h 944817"/>
-              <a:gd name="connsiteX8" fmla="*/ 62414 w 1638521"/>
-              <a:gd name="connsiteY8" fmla="*/ 721360 h 944817"/>
-              <a:gd name="connsiteX0" fmla="*/ 62414 w 1638521"/>
-              <a:gd name="connsiteY0" fmla="*/ 721360 h 943467"/>
-              <a:gd name="connsiteX1" fmla="*/ 538875 w 1638521"/>
-              <a:gd name="connsiteY1" fmla="*/ 812943 h 943467"/>
-              <a:gd name="connsiteX2" fmla="*/ 1021475 w 1638521"/>
-              <a:gd name="connsiteY2" fmla="*/ 391303 h 943467"/>
-              <a:gd name="connsiteX3" fmla="*/ 1628361 w 1638521"/>
-              <a:gd name="connsiteY3" fmla="*/ 0 h 943467"/>
-              <a:gd name="connsiteX4" fmla="*/ 1638521 w 1638521"/>
-              <a:gd name="connsiteY4" fmla="*/ 826101 h 943467"/>
-              <a:gd name="connsiteX5" fmla="*/ 1092595 w 1638521"/>
-              <a:gd name="connsiteY5" fmla="*/ 746903 h 943467"/>
-              <a:gd name="connsiteX6" fmla="*/ 528715 w 1638521"/>
-              <a:gd name="connsiteY6" fmla="*/ 934863 h 943467"/>
-              <a:gd name="connsiteX7" fmla="*/ 57334 w 1638521"/>
-              <a:gd name="connsiteY7" fmla="*/ 744821 h 943467"/>
-              <a:gd name="connsiteX8" fmla="*/ 62414 w 1638521"/>
-              <a:gd name="connsiteY8" fmla="*/ 721360 h 943467"/>
-              <a:gd name="connsiteX0" fmla="*/ 62414 w 1638521"/>
-              <a:gd name="connsiteY0" fmla="*/ 721360 h 943467"/>
-              <a:gd name="connsiteX1" fmla="*/ 538875 w 1638521"/>
-              <a:gd name="connsiteY1" fmla="*/ 812943 h 943467"/>
-              <a:gd name="connsiteX2" fmla="*/ 1021475 w 1638521"/>
-              <a:gd name="connsiteY2" fmla="*/ 391303 h 943467"/>
-              <a:gd name="connsiteX3" fmla="*/ 1628361 w 1638521"/>
-              <a:gd name="connsiteY3" fmla="*/ 0 h 943467"/>
-              <a:gd name="connsiteX4" fmla="*/ 1638521 w 1638521"/>
-              <a:gd name="connsiteY4" fmla="*/ 826101 h 943467"/>
-              <a:gd name="connsiteX5" fmla="*/ 1092595 w 1638521"/>
-              <a:gd name="connsiteY5" fmla="*/ 746903 h 943467"/>
-              <a:gd name="connsiteX6" fmla="*/ 528715 w 1638521"/>
-              <a:gd name="connsiteY6" fmla="*/ 934863 h 943467"/>
-              <a:gd name="connsiteX7" fmla="*/ 57334 w 1638521"/>
-              <a:gd name="connsiteY7" fmla="*/ 744821 h 943467"/>
-              <a:gd name="connsiteX8" fmla="*/ 62414 w 1638521"/>
-              <a:gd name="connsiteY8" fmla="*/ 721360 h 943467"/>
-              <a:gd name="connsiteX0" fmla="*/ 62414 w 1638521"/>
-              <a:gd name="connsiteY0" fmla="*/ 721360 h 934863"/>
-              <a:gd name="connsiteX1" fmla="*/ 538875 w 1638521"/>
-              <a:gd name="connsiteY1" fmla="*/ 812943 h 934863"/>
-              <a:gd name="connsiteX2" fmla="*/ 1021475 w 1638521"/>
-              <a:gd name="connsiteY2" fmla="*/ 391303 h 934863"/>
-              <a:gd name="connsiteX3" fmla="*/ 1628361 w 1638521"/>
-              <a:gd name="connsiteY3" fmla="*/ 0 h 934863"/>
-              <a:gd name="connsiteX4" fmla="*/ 1638521 w 1638521"/>
-              <a:gd name="connsiteY4" fmla="*/ 826101 h 934863"/>
-              <a:gd name="connsiteX5" fmla="*/ 1092595 w 1638521"/>
-              <a:gd name="connsiteY5" fmla="*/ 746903 h 934863"/>
-              <a:gd name="connsiteX6" fmla="*/ 528715 w 1638521"/>
-              <a:gd name="connsiteY6" fmla="*/ 934863 h 934863"/>
-              <a:gd name="connsiteX7" fmla="*/ 57334 w 1638521"/>
-              <a:gd name="connsiteY7" fmla="*/ 744821 h 934863"/>
-              <a:gd name="connsiteX8" fmla="*/ 62414 w 1638521"/>
-              <a:gd name="connsiteY8" fmla="*/ 721360 h 934863"/>
-              <a:gd name="connsiteX0" fmla="*/ 62414 w 1638521"/>
-              <a:gd name="connsiteY0" fmla="*/ 721360 h 934863"/>
-              <a:gd name="connsiteX1" fmla="*/ 538875 w 1638521"/>
-              <a:gd name="connsiteY1" fmla="*/ 812943 h 934863"/>
-              <a:gd name="connsiteX2" fmla="*/ 1021475 w 1638521"/>
-              <a:gd name="connsiteY2" fmla="*/ 391303 h 934863"/>
-              <a:gd name="connsiteX3" fmla="*/ 1628361 w 1638521"/>
-              <a:gd name="connsiteY3" fmla="*/ 0 h 934863"/>
-              <a:gd name="connsiteX4" fmla="*/ 1638521 w 1638521"/>
-              <a:gd name="connsiteY4" fmla="*/ 826101 h 934863"/>
-              <a:gd name="connsiteX5" fmla="*/ 1092595 w 1638521"/>
-              <a:gd name="connsiteY5" fmla="*/ 746903 h 934863"/>
-              <a:gd name="connsiteX6" fmla="*/ 528715 w 1638521"/>
-              <a:gd name="connsiteY6" fmla="*/ 934863 h 934863"/>
-              <a:gd name="connsiteX7" fmla="*/ 57334 w 1638521"/>
-              <a:gd name="connsiteY7" fmla="*/ 744821 h 934863"/>
-              <a:gd name="connsiteX8" fmla="*/ 62414 w 1638521"/>
-              <a:gd name="connsiteY8" fmla="*/ 721360 h 934863"/>
-              <a:gd name="connsiteX0" fmla="*/ 62414 w 1638521"/>
-              <a:gd name="connsiteY0" fmla="*/ 721360 h 934863"/>
-              <a:gd name="connsiteX1" fmla="*/ 538875 w 1638521"/>
-              <a:gd name="connsiteY1" fmla="*/ 812943 h 934863"/>
-              <a:gd name="connsiteX2" fmla="*/ 1021475 w 1638521"/>
-              <a:gd name="connsiteY2" fmla="*/ 391303 h 934863"/>
-              <a:gd name="connsiteX3" fmla="*/ 1628361 w 1638521"/>
-              <a:gd name="connsiteY3" fmla="*/ 0 h 934863"/>
-              <a:gd name="connsiteX4" fmla="*/ 1638521 w 1638521"/>
-              <a:gd name="connsiteY4" fmla="*/ 826101 h 934863"/>
-              <a:gd name="connsiteX5" fmla="*/ 1092595 w 1638521"/>
-              <a:gd name="connsiteY5" fmla="*/ 746903 h 934863"/>
-              <a:gd name="connsiteX6" fmla="*/ 528715 w 1638521"/>
-              <a:gd name="connsiteY6" fmla="*/ 934863 h 934863"/>
-              <a:gd name="connsiteX7" fmla="*/ 57334 w 1638521"/>
-              <a:gd name="connsiteY7" fmla="*/ 744821 h 934863"/>
-              <a:gd name="connsiteX8" fmla="*/ 62414 w 1638521"/>
-              <a:gd name="connsiteY8" fmla="*/ 721360 h 934863"/>
-              <a:gd name="connsiteX0" fmla="*/ 61167 w 1637274"/>
-              <a:gd name="connsiteY0" fmla="*/ 721360 h 965343"/>
-              <a:gd name="connsiteX1" fmla="*/ 537628 w 1637274"/>
-              <a:gd name="connsiteY1" fmla="*/ 812943 h 965343"/>
-              <a:gd name="connsiteX2" fmla="*/ 1020228 w 1637274"/>
-              <a:gd name="connsiteY2" fmla="*/ 391303 h 965343"/>
-              <a:gd name="connsiteX3" fmla="*/ 1627114 w 1637274"/>
-              <a:gd name="connsiteY3" fmla="*/ 0 h 965343"/>
-              <a:gd name="connsiteX4" fmla="*/ 1637274 w 1637274"/>
-              <a:gd name="connsiteY4" fmla="*/ 826101 h 965343"/>
-              <a:gd name="connsiteX5" fmla="*/ 1091348 w 1637274"/>
-              <a:gd name="connsiteY5" fmla="*/ 746903 h 965343"/>
-              <a:gd name="connsiteX6" fmla="*/ 517308 w 1637274"/>
-              <a:gd name="connsiteY6" fmla="*/ 965343 h 965343"/>
-              <a:gd name="connsiteX7" fmla="*/ 56087 w 1637274"/>
-              <a:gd name="connsiteY7" fmla="*/ 744821 h 965343"/>
-              <a:gd name="connsiteX8" fmla="*/ 61167 w 1637274"/>
-              <a:gd name="connsiteY8" fmla="*/ 721360 h 965343"/>
-              <a:gd name="connsiteX0" fmla="*/ 10004 w 2096064"/>
-              <a:gd name="connsiteY0" fmla="*/ 897206 h 965343"/>
-              <a:gd name="connsiteX1" fmla="*/ 996418 w 2096064"/>
-              <a:gd name="connsiteY1" fmla="*/ 812943 h 965343"/>
-              <a:gd name="connsiteX2" fmla="*/ 1479018 w 2096064"/>
-              <a:gd name="connsiteY2" fmla="*/ 391303 h 965343"/>
-              <a:gd name="connsiteX3" fmla="*/ 2085904 w 2096064"/>
-              <a:gd name="connsiteY3" fmla="*/ 0 h 965343"/>
-              <a:gd name="connsiteX4" fmla="*/ 2096064 w 2096064"/>
-              <a:gd name="connsiteY4" fmla="*/ 826101 h 965343"/>
-              <a:gd name="connsiteX5" fmla="*/ 1550138 w 2096064"/>
-              <a:gd name="connsiteY5" fmla="*/ 746903 h 965343"/>
-              <a:gd name="connsiteX6" fmla="*/ 976098 w 2096064"/>
-              <a:gd name="connsiteY6" fmla="*/ 965343 h 965343"/>
-              <a:gd name="connsiteX7" fmla="*/ 514877 w 2096064"/>
-              <a:gd name="connsiteY7" fmla="*/ 744821 h 965343"/>
-              <a:gd name="connsiteX8" fmla="*/ 10004 w 2096064"/>
-              <a:gd name="connsiteY8" fmla="*/ 897206 h 965343"/>
-              <a:gd name="connsiteX0" fmla="*/ 10779 w 2096839"/>
-              <a:gd name="connsiteY0" fmla="*/ 897206 h 965343"/>
-              <a:gd name="connsiteX1" fmla="*/ 997193 w 2096839"/>
-              <a:gd name="connsiteY1" fmla="*/ 812943 h 965343"/>
-              <a:gd name="connsiteX2" fmla="*/ 1479793 w 2096839"/>
-              <a:gd name="connsiteY2" fmla="*/ 391303 h 965343"/>
-              <a:gd name="connsiteX3" fmla="*/ 2086679 w 2096839"/>
-              <a:gd name="connsiteY3" fmla="*/ 0 h 965343"/>
-              <a:gd name="connsiteX4" fmla="*/ 2096839 w 2096839"/>
-              <a:gd name="connsiteY4" fmla="*/ 826101 h 965343"/>
-              <a:gd name="connsiteX5" fmla="*/ 1550913 w 2096839"/>
-              <a:gd name="connsiteY5" fmla="*/ 746903 h 965343"/>
-              <a:gd name="connsiteX6" fmla="*/ 976873 w 2096839"/>
-              <a:gd name="connsiteY6" fmla="*/ 965343 h 965343"/>
-              <a:gd name="connsiteX7" fmla="*/ 480483 w 2096839"/>
-              <a:gd name="connsiteY7" fmla="*/ 709652 h 965343"/>
-              <a:gd name="connsiteX8" fmla="*/ 10779 w 2096839"/>
-              <a:gd name="connsiteY8" fmla="*/ 897206 h 965343"/>
-              <a:gd name="connsiteX0" fmla="*/ 11578 w 2097638"/>
-              <a:gd name="connsiteY0" fmla="*/ 897206 h 965343"/>
-              <a:gd name="connsiteX1" fmla="*/ 997992 w 2097638"/>
-              <a:gd name="connsiteY1" fmla="*/ 812943 h 965343"/>
-              <a:gd name="connsiteX2" fmla="*/ 1480592 w 2097638"/>
-              <a:gd name="connsiteY2" fmla="*/ 391303 h 965343"/>
-              <a:gd name="connsiteX3" fmla="*/ 2087478 w 2097638"/>
-              <a:gd name="connsiteY3" fmla="*/ 0 h 965343"/>
-              <a:gd name="connsiteX4" fmla="*/ 2097638 w 2097638"/>
-              <a:gd name="connsiteY4" fmla="*/ 826101 h 965343"/>
-              <a:gd name="connsiteX5" fmla="*/ 1551712 w 2097638"/>
-              <a:gd name="connsiteY5" fmla="*/ 746903 h 965343"/>
-              <a:gd name="connsiteX6" fmla="*/ 977672 w 2097638"/>
-              <a:gd name="connsiteY6" fmla="*/ 965343 h 965343"/>
-              <a:gd name="connsiteX7" fmla="*/ 481282 w 2097638"/>
-              <a:gd name="connsiteY7" fmla="*/ 709652 h 965343"/>
-              <a:gd name="connsiteX8" fmla="*/ 463029 w 2097638"/>
-              <a:gd name="connsiteY8" fmla="*/ 885235 h 965343"/>
-              <a:gd name="connsiteX9" fmla="*/ 11578 w 2097638"/>
-              <a:gd name="connsiteY9" fmla="*/ 897206 h 965343"/>
-              <a:gd name="connsiteX0" fmla="*/ 11578 w 2097638"/>
-              <a:gd name="connsiteY0" fmla="*/ 897206 h 965343"/>
-              <a:gd name="connsiteX1" fmla="*/ 997992 w 2097638"/>
-              <a:gd name="connsiteY1" fmla="*/ 812943 h 965343"/>
-              <a:gd name="connsiteX2" fmla="*/ 1480592 w 2097638"/>
-              <a:gd name="connsiteY2" fmla="*/ 391303 h 965343"/>
-              <a:gd name="connsiteX3" fmla="*/ 2087478 w 2097638"/>
-              <a:gd name="connsiteY3" fmla="*/ 0 h 965343"/>
-              <a:gd name="connsiteX4" fmla="*/ 2097638 w 2097638"/>
-              <a:gd name="connsiteY4" fmla="*/ 826101 h 965343"/>
-              <a:gd name="connsiteX5" fmla="*/ 1551712 w 2097638"/>
-              <a:gd name="connsiteY5" fmla="*/ 746903 h 965343"/>
-              <a:gd name="connsiteX6" fmla="*/ 977672 w 2097638"/>
-              <a:gd name="connsiteY6" fmla="*/ 965343 h 965343"/>
-              <a:gd name="connsiteX7" fmla="*/ 633682 w 2097638"/>
-              <a:gd name="connsiteY7" fmla="*/ 903083 h 965343"/>
-              <a:gd name="connsiteX8" fmla="*/ 463029 w 2097638"/>
-              <a:gd name="connsiteY8" fmla="*/ 885235 h 965343"/>
-              <a:gd name="connsiteX9" fmla="*/ 11578 w 2097638"/>
-              <a:gd name="connsiteY9" fmla="*/ 897206 h 965343"/>
-              <a:gd name="connsiteX0" fmla="*/ 11578 w 2097638"/>
-              <a:gd name="connsiteY0" fmla="*/ 897206 h 965343"/>
-              <a:gd name="connsiteX1" fmla="*/ 997992 w 2097638"/>
-              <a:gd name="connsiteY1" fmla="*/ 812943 h 965343"/>
-              <a:gd name="connsiteX2" fmla="*/ 1480592 w 2097638"/>
-              <a:gd name="connsiteY2" fmla="*/ 391303 h 965343"/>
-              <a:gd name="connsiteX3" fmla="*/ 2087478 w 2097638"/>
-              <a:gd name="connsiteY3" fmla="*/ 0 h 965343"/>
-              <a:gd name="connsiteX4" fmla="*/ 2097638 w 2097638"/>
-              <a:gd name="connsiteY4" fmla="*/ 826101 h 965343"/>
-              <a:gd name="connsiteX5" fmla="*/ 1551712 w 2097638"/>
-              <a:gd name="connsiteY5" fmla="*/ 746903 h 965343"/>
-              <a:gd name="connsiteX6" fmla="*/ 977672 w 2097638"/>
-              <a:gd name="connsiteY6" fmla="*/ 965343 h 965343"/>
-              <a:gd name="connsiteX7" fmla="*/ 633682 w 2097638"/>
-              <a:gd name="connsiteY7" fmla="*/ 903083 h 965343"/>
-              <a:gd name="connsiteX8" fmla="*/ 463029 w 2097638"/>
-              <a:gd name="connsiteY8" fmla="*/ 691804 h 965343"/>
-              <a:gd name="connsiteX9" fmla="*/ 11578 w 2097638"/>
-              <a:gd name="connsiteY9" fmla="*/ 897206 h 965343"/>
-              <a:gd name="connsiteX0" fmla="*/ 11578 w 2097638"/>
-              <a:gd name="connsiteY0" fmla="*/ 897206 h 965343"/>
-              <a:gd name="connsiteX1" fmla="*/ 997992 w 2097638"/>
-              <a:gd name="connsiteY1" fmla="*/ 812943 h 965343"/>
-              <a:gd name="connsiteX2" fmla="*/ 1480592 w 2097638"/>
-              <a:gd name="connsiteY2" fmla="*/ 391303 h 965343"/>
-              <a:gd name="connsiteX3" fmla="*/ 2087478 w 2097638"/>
-              <a:gd name="connsiteY3" fmla="*/ 0 h 965343"/>
-              <a:gd name="connsiteX4" fmla="*/ 2097638 w 2097638"/>
-              <a:gd name="connsiteY4" fmla="*/ 826101 h 965343"/>
-              <a:gd name="connsiteX5" fmla="*/ 1551712 w 2097638"/>
-              <a:gd name="connsiteY5" fmla="*/ 746903 h 965343"/>
-              <a:gd name="connsiteX6" fmla="*/ 977672 w 2097638"/>
-              <a:gd name="connsiteY6" fmla="*/ 965343 h 965343"/>
-              <a:gd name="connsiteX7" fmla="*/ 633682 w 2097638"/>
-              <a:gd name="connsiteY7" fmla="*/ 785852 h 965343"/>
-              <a:gd name="connsiteX8" fmla="*/ 463029 w 2097638"/>
-              <a:gd name="connsiteY8" fmla="*/ 691804 h 965343"/>
-              <a:gd name="connsiteX9" fmla="*/ 11578 w 2097638"/>
-              <a:gd name="connsiteY9" fmla="*/ 897206 h 965343"/>
-              <a:gd name="connsiteX0" fmla="*/ 11975 w 2098035"/>
-              <a:gd name="connsiteY0" fmla="*/ 897206 h 965343"/>
-              <a:gd name="connsiteX1" fmla="*/ 998389 w 2098035"/>
-              <a:gd name="connsiteY1" fmla="*/ 812943 h 965343"/>
-              <a:gd name="connsiteX2" fmla="*/ 1480989 w 2098035"/>
-              <a:gd name="connsiteY2" fmla="*/ 391303 h 965343"/>
-              <a:gd name="connsiteX3" fmla="*/ 2087875 w 2098035"/>
-              <a:gd name="connsiteY3" fmla="*/ 0 h 965343"/>
-              <a:gd name="connsiteX4" fmla="*/ 2098035 w 2098035"/>
-              <a:gd name="connsiteY4" fmla="*/ 826101 h 965343"/>
-              <a:gd name="connsiteX5" fmla="*/ 1552109 w 2098035"/>
-              <a:gd name="connsiteY5" fmla="*/ 746903 h 965343"/>
-              <a:gd name="connsiteX6" fmla="*/ 978069 w 2098035"/>
-              <a:gd name="connsiteY6" fmla="*/ 965343 h 965343"/>
-              <a:gd name="connsiteX7" fmla="*/ 634079 w 2098035"/>
-              <a:gd name="connsiteY7" fmla="*/ 785852 h 965343"/>
-              <a:gd name="connsiteX8" fmla="*/ 445842 w 2098035"/>
-              <a:gd name="connsiteY8" fmla="*/ 879373 h 965343"/>
-              <a:gd name="connsiteX9" fmla="*/ 11975 w 2098035"/>
-              <a:gd name="connsiteY9" fmla="*/ 897206 h 965343"/>
-              <a:gd name="connsiteX0" fmla="*/ 11975 w 2098035"/>
-              <a:gd name="connsiteY0" fmla="*/ 897206 h 965343"/>
-              <a:gd name="connsiteX1" fmla="*/ 998389 w 2098035"/>
-              <a:gd name="connsiteY1" fmla="*/ 812943 h 965343"/>
-              <a:gd name="connsiteX2" fmla="*/ 1480989 w 2098035"/>
-              <a:gd name="connsiteY2" fmla="*/ 391303 h 965343"/>
-              <a:gd name="connsiteX3" fmla="*/ 2087875 w 2098035"/>
-              <a:gd name="connsiteY3" fmla="*/ 0 h 965343"/>
-              <a:gd name="connsiteX4" fmla="*/ 2098035 w 2098035"/>
-              <a:gd name="connsiteY4" fmla="*/ 826101 h 965343"/>
-              <a:gd name="connsiteX5" fmla="*/ 1552109 w 2098035"/>
-              <a:gd name="connsiteY5" fmla="*/ 746903 h 965343"/>
-              <a:gd name="connsiteX6" fmla="*/ 978069 w 2098035"/>
-              <a:gd name="connsiteY6" fmla="*/ 965343 h 965343"/>
-              <a:gd name="connsiteX7" fmla="*/ 634079 w 2098035"/>
-              <a:gd name="connsiteY7" fmla="*/ 885498 h 965343"/>
-              <a:gd name="connsiteX8" fmla="*/ 445842 w 2098035"/>
-              <a:gd name="connsiteY8" fmla="*/ 879373 h 965343"/>
-              <a:gd name="connsiteX9" fmla="*/ 11975 w 2098035"/>
-              <a:gd name="connsiteY9" fmla="*/ 897206 h 965343"/>
-              <a:gd name="connsiteX0" fmla="*/ 11975 w 2098035"/>
-              <a:gd name="connsiteY0" fmla="*/ 897206 h 965343"/>
-              <a:gd name="connsiteX1" fmla="*/ 457565 w 2098035"/>
-              <a:gd name="connsiteY1" fmla="*/ 697666 h 965343"/>
-              <a:gd name="connsiteX2" fmla="*/ 998389 w 2098035"/>
-              <a:gd name="connsiteY2" fmla="*/ 812943 h 965343"/>
-              <a:gd name="connsiteX3" fmla="*/ 1480989 w 2098035"/>
-              <a:gd name="connsiteY3" fmla="*/ 391303 h 965343"/>
-              <a:gd name="connsiteX4" fmla="*/ 2087875 w 2098035"/>
-              <a:gd name="connsiteY4" fmla="*/ 0 h 965343"/>
-              <a:gd name="connsiteX5" fmla="*/ 2098035 w 2098035"/>
-              <a:gd name="connsiteY5" fmla="*/ 826101 h 965343"/>
-              <a:gd name="connsiteX6" fmla="*/ 1552109 w 2098035"/>
-              <a:gd name="connsiteY6" fmla="*/ 746903 h 965343"/>
-              <a:gd name="connsiteX7" fmla="*/ 978069 w 2098035"/>
-              <a:gd name="connsiteY7" fmla="*/ 965343 h 965343"/>
-              <a:gd name="connsiteX8" fmla="*/ 634079 w 2098035"/>
-              <a:gd name="connsiteY8" fmla="*/ 885498 h 965343"/>
-              <a:gd name="connsiteX9" fmla="*/ 445842 w 2098035"/>
-              <a:gd name="connsiteY9" fmla="*/ 879373 h 965343"/>
-              <a:gd name="connsiteX10" fmla="*/ 11975 w 2098035"/>
-              <a:gd name="connsiteY10" fmla="*/ 897206 h 965343"/>
-              <a:gd name="connsiteX0" fmla="*/ 11975 w 2098035"/>
-              <a:gd name="connsiteY0" fmla="*/ 897206 h 965343"/>
-              <a:gd name="connsiteX1" fmla="*/ 475149 w 2098035"/>
-              <a:gd name="connsiteY1" fmla="*/ 709389 h 965343"/>
-              <a:gd name="connsiteX2" fmla="*/ 998389 w 2098035"/>
-              <a:gd name="connsiteY2" fmla="*/ 812943 h 965343"/>
-              <a:gd name="connsiteX3" fmla="*/ 1480989 w 2098035"/>
-              <a:gd name="connsiteY3" fmla="*/ 391303 h 965343"/>
-              <a:gd name="connsiteX4" fmla="*/ 2087875 w 2098035"/>
-              <a:gd name="connsiteY4" fmla="*/ 0 h 965343"/>
-              <a:gd name="connsiteX5" fmla="*/ 2098035 w 2098035"/>
-              <a:gd name="connsiteY5" fmla="*/ 826101 h 965343"/>
-              <a:gd name="connsiteX6" fmla="*/ 1552109 w 2098035"/>
-              <a:gd name="connsiteY6" fmla="*/ 746903 h 965343"/>
-              <a:gd name="connsiteX7" fmla="*/ 978069 w 2098035"/>
-              <a:gd name="connsiteY7" fmla="*/ 965343 h 965343"/>
-              <a:gd name="connsiteX8" fmla="*/ 634079 w 2098035"/>
-              <a:gd name="connsiteY8" fmla="*/ 885498 h 965343"/>
-              <a:gd name="connsiteX9" fmla="*/ 445842 w 2098035"/>
-              <a:gd name="connsiteY9" fmla="*/ 879373 h 965343"/>
-              <a:gd name="connsiteX10" fmla="*/ 11975 w 2098035"/>
-              <a:gd name="connsiteY10" fmla="*/ 897206 h 965343"/>
-              <a:gd name="connsiteX0" fmla="*/ 1525 w 2087585"/>
-              <a:gd name="connsiteY0" fmla="*/ 897206 h 965343"/>
-              <a:gd name="connsiteX1" fmla="*/ 464699 w 2087585"/>
-              <a:gd name="connsiteY1" fmla="*/ 709389 h 965343"/>
-              <a:gd name="connsiteX2" fmla="*/ 987939 w 2087585"/>
-              <a:gd name="connsiteY2" fmla="*/ 812943 h 965343"/>
-              <a:gd name="connsiteX3" fmla="*/ 1470539 w 2087585"/>
-              <a:gd name="connsiteY3" fmla="*/ 391303 h 965343"/>
-              <a:gd name="connsiteX4" fmla="*/ 2077425 w 2087585"/>
-              <a:gd name="connsiteY4" fmla="*/ 0 h 965343"/>
-              <a:gd name="connsiteX5" fmla="*/ 2087585 w 2087585"/>
-              <a:gd name="connsiteY5" fmla="*/ 826101 h 965343"/>
-              <a:gd name="connsiteX6" fmla="*/ 1541659 w 2087585"/>
-              <a:gd name="connsiteY6" fmla="*/ 746903 h 965343"/>
-              <a:gd name="connsiteX7" fmla="*/ 967619 w 2087585"/>
-              <a:gd name="connsiteY7" fmla="*/ 965343 h 965343"/>
-              <a:gd name="connsiteX8" fmla="*/ 623629 w 2087585"/>
-              <a:gd name="connsiteY8" fmla="*/ 885498 h 965343"/>
-              <a:gd name="connsiteX9" fmla="*/ 1525 w 2087585"/>
-              <a:gd name="connsiteY9" fmla="*/ 897206 h 965343"/>
-              <a:gd name="connsiteX0" fmla="*/ 1525 w 2087585"/>
-              <a:gd name="connsiteY0" fmla="*/ 897206 h 965343"/>
-              <a:gd name="connsiteX1" fmla="*/ 464699 w 2087585"/>
-              <a:gd name="connsiteY1" fmla="*/ 709389 h 965343"/>
-              <a:gd name="connsiteX2" fmla="*/ 987939 w 2087585"/>
-              <a:gd name="connsiteY2" fmla="*/ 812943 h 965343"/>
-              <a:gd name="connsiteX3" fmla="*/ 1470539 w 2087585"/>
-              <a:gd name="connsiteY3" fmla="*/ 391303 h 965343"/>
-              <a:gd name="connsiteX4" fmla="*/ 2077425 w 2087585"/>
-              <a:gd name="connsiteY4" fmla="*/ 0 h 965343"/>
-              <a:gd name="connsiteX5" fmla="*/ 2087585 w 2087585"/>
-              <a:gd name="connsiteY5" fmla="*/ 826101 h 965343"/>
-              <a:gd name="connsiteX6" fmla="*/ 1541659 w 2087585"/>
-              <a:gd name="connsiteY6" fmla="*/ 746903 h 965343"/>
-              <a:gd name="connsiteX7" fmla="*/ 967619 w 2087585"/>
-              <a:gd name="connsiteY7" fmla="*/ 965343 h 965343"/>
-              <a:gd name="connsiteX8" fmla="*/ 453645 w 2087585"/>
-              <a:gd name="connsiteY8" fmla="*/ 791713 h 965343"/>
-              <a:gd name="connsiteX9" fmla="*/ 1525 w 2087585"/>
-              <a:gd name="connsiteY9" fmla="*/ 897206 h 965343"/>
-              <a:gd name="connsiteX0" fmla="*/ 1525 w 2087585"/>
-              <a:gd name="connsiteY0" fmla="*/ 897206 h 965343"/>
-              <a:gd name="connsiteX1" fmla="*/ 464699 w 2087585"/>
-              <a:gd name="connsiteY1" fmla="*/ 709389 h 965343"/>
-              <a:gd name="connsiteX2" fmla="*/ 1005523 w 2087585"/>
-              <a:gd name="connsiteY2" fmla="*/ 748466 h 965343"/>
-              <a:gd name="connsiteX3" fmla="*/ 1470539 w 2087585"/>
-              <a:gd name="connsiteY3" fmla="*/ 391303 h 965343"/>
-              <a:gd name="connsiteX4" fmla="*/ 2077425 w 2087585"/>
-              <a:gd name="connsiteY4" fmla="*/ 0 h 965343"/>
-              <a:gd name="connsiteX5" fmla="*/ 2087585 w 2087585"/>
-              <a:gd name="connsiteY5" fmla="*/ 826101 h 965343"/>
-              <a:gd name="connsiteX6" fmla="*/ 1541659 w 2087585"/>
-              <a:gd name="connsiteY6" fmla="*/ 746903 h 965343"/>
-              <a:gd name="connsiteX7" fmla="*/ 967619 w 2087585"/>
-              <a:gd name="connsiteY7" fmla="*/ 965343 h 965343"/>
-              <a:gd name="connsiteX8" fmla="*/ 453645 w 2087585"/>
-              <a:gd name="connsiteY8" fmla="*/ 791713 h 965343"/>
-              <a:gd name="connsiteX9" fmla="*/ 1525 w 2087585"/>
-              <a:gd name="connsiteY9" fmla="*/ 897206 h 965343"/>
-            </a:gdLst>
-            <a:ahLst/>
-            <a:cxnLst>
-              <a:cxn ang="0">
-                <a:pos x="connsiteX0" y="connsiteY0"/>
-              </a:cxn>
-              <a:cxn ang="0">
-                <a:pos x="connsiteX1" y="connsiteY1"/>
-              </a:cxn>
-              <a:cxn ang="0">
-                <a:pos x="connsiteX2" y="connsiteY2"/>
-              </a:cxn>
-              <a:cxn ang="0">
-                <a:pos x="connsiteX3" y="connsiteY3"/>
-              </a:cxn>
-              <a:cxn ang="0">
-                <a:pos x="connsiteX4" y="connsiteY4"/>
-              </a:cxn>
-              <a:cxn ang="0">
-                <a:pos x="connsiteX5" y="connsiteY5"/>
-              </a:cxn>
-              <a:cxn ang="0">
-                <a:pos x="connsiteX6" y="connsiteY6"/>
-              </a:cxn>
-              <a:cxn ang="0">
-                <a:pos x="connsiteX7" y="connsiteY7"/>
-              </a:cxn>
-              <a:cxn ang="0">
-                <a:pos x="connsiteX8" y="connsiteY8"/>
-              </a:cxn>
-              <a:cxn ang="0">
-                <a:pos x="connsiteX9" y="connsiteY9"/>
-              </a:cxn>
-            </a:cxnLst>
-            <a:rect l="l" t="t" r="r" b="b"/>
-            <a:pathLst>
-              <a:path w="2087585" h="965343">
-                <a:moveTo>
-                  <a:pt x="1525" y="897206"/>
-                </a:moveTo>
-                <a:cubicBezTo>
-                  <a:pt x="-24963" y="867855"/>
-                  <a:pt x="300297" y="723433"/>
-                  <a:pt x="464699" y="709389"/>
-                </a:cubicBezTo>
-                <a:cubicBezTo>
-                  <a:pt x="629101" y="695345"/>
-                  <a:pt x="864260" y="821996"/>
-                  <a:pt x="1005523" y="748466"/>
-                </a:cubicBezTo>
-                <a:lnTo>
-                  <a:pt x="1470539" y="391303"/>
-                </a:lnTo>
-                <a:lnTo>
-                  <a:pt x="2077425" y="0"/>
-                </a:lnTo>
-                <a:cubicBezTo>
-                  <a:pt x="2081206" y="179146"/>
-                  <a:pt x="2087585" y="369870"/>
-                  <a:pt x="2087585" y="826101"/>
-                </a:cubicBezTo>
-                <a:cubicBezTo>
-                  <a:pt x="1861131" y="782945"/>
-                  <a:pt x="1735093" y="773649"/>
-                  <a:pt x="1541659" y="746903"/>
-                </a:cubicBezTo>
-                <a:cubicBezTo>
-                  <a:pt x="1363465" y="776037"/>
-                  <a:pt x="1181874" y="900145"/>
-                  <a:pt x="967619" y="965343"/>
-                </a:cubicBezTo>
-                <a:cubicBezTo>
-                  <a:pt x="800461" y="923223"/>
-                  <a:pt x="542349" y="806041"/>
-                  <a:pt x="453645" y="791713"/>
-                </a:cubicBezTo>
-                <a:cubicBezTo>
-                  <a:pt x="292629" y="780357"/>
-                  <a:pt x="28013" y="926557"/>
-                  <a:pt x="1525" y="897206"/>
-                </a:cubicBezTo>
-                <a:close/>
-              </a:path>
-            </a:pathLst>
-          </a:custGeom>
-          <a:solidFill>
-            <a:srgbClr val="FFC000">
-              <a:alpha val="38824"/>
-            </a:srgbClr>
-          </a:solidFill>
-          <a:ln>
-            <a:noFill/>
-          </a:ln>
-        </p:spPr>
-        <p:style>
-          <a:lnRef idx="2">
-            <a:schemeClr val="accent1">
-              <a:shade val="50000"/>
-            </a:schemeClr>
-          </a:lnRef>
-          <a:fillRef idx="1">
-            <a:schemeClr val="accent1"/>
-          </a:fillRef>
-          <a:effectRef idx="0">
-            <a:schemeClr val="accent1"/>
-          </a:effectRef>
-          <a:fontRef idx="minor">
-            <a:schemeClr val="lt1"/>
-          </a:fontRef>
-        </p:style>
-        <p:txBody>
-          <a:bodyPr rtlCol="0" anchor="ctr"/>
-          <a:lstStyle/>
-          <a:p>
-            <a:pPr algn="ctr"/>
-            <a:endParaRPr lang="en-US"/>
           </a:p>
         </p:txBody>
       </p:sp>
@@ -3854,6 +3027,45 @@
           </p:style>
         </p:cxnSp>
       </p:grpSp>
+      <p:sp>
+        <p:nvSpPr>
+          <p:cNvPr id="21" name="TextBox 20"/>
+          <p:cNvSpPr txBox="1"/>
+          <p:nvPr/>
+        </p:nvSpPr>
+        <p:spPr>
+          <a:xfrm>
+            <a:off x="3642360" y="2522097"/>
+            <a:ext cx="510540" cy="215444"/>
+          </a:xfrm>
+          <a:prstGeom prst="rect">
+            <a:avLst/>
+          </a:prstGeom>
+          <a:noFill/>
+        </p:spPr>
+        <p:txBody>
+          <a:bodyPr wrap="square" rtlCol="0">
+            <a:spAutoFit/>
+          </a:bodyPr>
+          <a:lstStyle/>
+          <a:p>
+            <a:pPr algn="r"/>
+            <a:r>
+              <a:rPr lang="en-US" sz="800" dirty="0" smtClean="0">
+                <a:latin typeface="Tahoma" pitchFamily="34" charset="0"/>
+                <a:ea typeface="Tahoma" pitchFamily="34" charset="0"/>
+                <a:cs typeface="Tahoma" pitchFamily="34" charset="0"/>
+              </a:rPr>
+              <a:t>Actual</a:t>
+            </a:r>
+            <a:endParaRPr lang="en-US" sz="800" dirty="0">
+              <a:latin typeface="Tahoma" pitchFamily="34" charset="0"/>
+              <a:ea typeface="Tahoma" pitchFamily="34" charset="0"/>
+              <a:cs typeface="Tahoma" pitchFamily="34" charset="0"/>
+            </a:endParaRPr>
+          </a:p>
+        </p:txBody>
+      </p:sp>
     </p:spTree>
     <p:extLst>
       <p:ext uri="{BB962C8B-B14F-4D97-AF65-F5344CB8AC3E}">
@@ -4691,11 +3903,6 @@
               </a:rPr>
               <a:t>5</a:t>
             </a:r>
-            <a:endParaRPr lang="en-US" sz="1000" b="1" dirty="0">
-              <a:solidFill>
-                <a:schemeClr val="tx1"/>
-              </a:solidFill>
-            </a:endParaRPr>
           </a:p>
         </p:txBody>
       </p:sp>
@@ -5537,11 +4744,6 @@
               </a:rPr>
               <a:t>5</a:t>
             </a:r>
-            <a:endParaRPr lang="en-US" sz="1000" b="1" dirty="0">
-              <a:solidFill>
-                <a:schemeClr val="tx1"/>
-              </a:solidFill>
-            </a:endParaRPr>
           </a:p>
         </p:txBody>
       </p:sp>
@@ -7566,17 +6768,20 @@
           <a:prstGeom prst="line">
             <a:avLst/>
           </a:prstGeom>
-          <a:ln w="38100"/>
+          <a:ln>
+            <a:headEnd type="oval" w="med" len="med"/>
+            <a:tailEnd type="oval" w="med" len="med"/>
+          </a:ln>
         </p:spPr>
         <p:style>
-          <a:lnRef idx="1">
-            <a:schemeClr val="accent1"/>
+          <a:lnRef idx="3">
+            <a:schemeClr val="dk1"/>
           </a:lnRef>
           <a:fillRef idx="0">
-            <a:schemeClr val="accent1"/>
+            <a:schemeClr val="dk1"/>
           </a:fillRef>
-          <a:effectRef idx="0">
-            <a:schemeClr val="accent1"/>
+          <a:effectRef idx="2">
+            <a:schemeClr val="dk1"/>
           </a:effectRef>
           <a:fontRef idx="minor">
             <a:schemeClr val="tx1"/>
@@ -7597,17 +6802,20 @@
           <a:prstGeom prst="line">
             <a:avLst/>
           </a:prstGeom>
-          <a:ln w="38100"/>
+          <a:ln>
+            <a:headEnd type="oval" w="med" len="med"/>
+            <a:tailEnd type="oval" w="med" len="med"/>
+          </a:ln>
         </p:spPr>
         <p:style>
-          <a:lnRef idx="1">
-            <a:schemeClr val="accent1"/>
+          <a:lnRef idx="3">
+            <a:schemeClr val="dk1"/>
           </a:lnRef>
           <a:fillRef idx="0">
-            <a:schemeClr val="accent1"/>
+            <a:schemeClr val="dk1"/>
           </a:fillRef>
-          <a:effectRef idx="0">
-            <a:schemeClr val="accent1"/>
+          <a:effectRef idx="2">
+            <a:schemeClr val="dk1"/>
           </a:effectRef>
           <a:fontRef idx="minor">
             <a:schemeClr val="tx1"/>
@@ -7633,14 +6841,14 @@
           </a:ln>
         </p:spPr>
         <p:style>
-          <a:lnRef idx="3">
-            <a:schemeClr val="accent2"/>
+          <a:lnRef idx="2">
+            <a:schemeClr val="accent1"/>
           </a:lnRef>
           <a:fillRef idx="0">
-            <a:schemeClr val="accent2"/>
+            <a:schemeClr val="accent1"/>
           </a:fillRef>
-          <a:effectRef idx="2">
-            <a:schemeClr val="accent2"/>
+          <a:effectRef idx="1">
+            <a:schemeClr val="accent1"/>
           </a:effectRef>
           <a:fontRef idx="minor">
             <a:schemeClr val="tx1"/>
@@ -8471,17 +7679,20 @@
           <a:prstGeom prst="line">
             <a:avLst/>
           </a:prstGeom>
-          <a:ln w="38100"/>
+          <a:ln>
+            <a:headEnd type="oval" w="med" len="med"/>
+            <a:tailEnd type="oval" w="med" len="med"/>
+          </a:ln>
         </p:spPr>
         <p:style>
-          <a:lnRef idx="1">
-            <a:schemeClr val="accent1"/>
+          <a:lnRef idx="3">
+            <a:schemeClr val="dk1"/>
           </a:lnRef>
           <a:fillRef idx="0">
-            <a:schemeClr val="accent1"/>
+            <a:schemeClr val="dk1"/>
           </a:fillRef>
-          <a:effectRef idx="0">
-            <a:schemeClr val="accent1"/>
+          <a:effectRef idx="2">
+            <a:schemeClr val="dk1"/>
           </a:effectRef>
           <a:fontRef idx="minor">
             <a:schemeClr val="tx1"/>
@@ -8507,14 +7718,14 @@
           </a:ln>
         </p:spPr>
         <p:style>
-          <a:lnRef idx="3">
-            <a:schemeClr val="accent2"/>
+          <a:lnRef idx="2">
+            <a:schemeClr val="accent1"/>
           </a:lnRef>
           <a:fillRef idx="0">
-            <a:schemeClr val="accent2"/>
+            <a:schemeClr val="accent1"/>
           </a:fillRef>
-          <a:effectRef idx="2">
-            <a:schemeClr val="accent2"/>
+          <a:effectRef idx="1">
+            <a:schemeClr val="accent1"/>
           </a:effectRef>
           <a:fontRef idx="minor">
             <a:schemeClr val="tx1"/>
@@ -8652,17 +7863,20 @@
           <a:prstGeom prst="line">
             <a:avLst/>
           </a:prstGeom>
-          <a:ln w="38100"/>
+          <a:ln>
+            <a:headEnd type="oval" w="med" len="med"/>
+            <a:tailEnd type="oval" w="med" len="med"/>
+          </a:ln>
         </p:spPr>
         <p:style>
-          <a:lnRef idx="1">
-            <a:schemeClr val="accent1"/>
+          <a:lnRef idx="3">
+            <a:schemeClr val="dk1"/>
           </a:lnRef>
           <a:fillRef idx="0">
-            <a:schemeClr val="accent1"/>
+            <a:schemeClr val="dk1"/>
           </a:fillRef>
-          <a:effectRef idx="0">
-            <a:schemeClr val="accent1"/>
+          <a:effectRef idx="2">
+            <a:schemeClr val="dk1"/>
           </a:effectRef>
           <a:fontRef idx="minor">
             <a:schemeClr val="tx1"/>

</xml_diff>

<commit_message>
cycle 2 round 1 prototype (3.0.0)
</commit_message>
<xml_diff>
--- a/HANDS/trunk/data/Design.pptx
+++ b/HANDS/trunk/data/Design.pptx
@@ -147,7 +147,7 @@
           <a:p>
             <a:fld id="{46B0DD1D-ED37-4907-8AD7-C556D0397C4A}" type="datetimeFigureOut">
               <a:rPr lang="en-US" smtClean="0"/>
-              <a:t>3/16/2012</a:t>
+              <a:t>9/6/2012</a:t>
             </a:fld>
             <a:endParaRPr lang="en-US"/>
           </a:p>
@@ -303,7 +303,7 @@
           <a:p>
             <a:fld id="{46B0DD1D-ED37-4907-8AD7-C556D0397C4A}" type="datetimeFigureOut">
               <a:rPr lang="en-US" smtClean="0"/>
-              <a:t>3/16/2012</a:t>
+              <a:t>9/6/2012</a:t>
             </a:fld>
             <a:endParaRPr lang="en-US"/>
           </a:p>
@@ -1295,7 +1295,7 @@
           <a:p>
             <a:fld id="{46B0DD1D-ED37-4907-8AD7-C556D0397C4A}" type="datetimeFigureOut">
               <a:rPr lang="en-US" smtClean="0"/>
-              <a:t>3/16/2012</a:t>
+              <a:t>9/6/2012</a:t>
             </a:fld>
             <a:endParaRPr lang="en-US"/>
           </a:p>
@@ -2040,7 +2040,7 @@
           <a:p>
             <a:fld id="{46B0DD1D-ED37-4907-8AD7-C556D0397C4A}" type="datetimeFigureOut">
               <a:rPr lang="en-US" smtClean="0"/>
-              <a:t>3/16/2012</a:t>
+              <a:t>9/6/2012</a:t>
             </a:fld>
             <a:endParaRPr lang="en-US"/>
           </a:p>
@@ -7672,9 +7672,9 @@
           <p:nvPr/>
         </p:nvCxnSpPr>
         <p:spPr>
-          <a:xfrm flipV="1">
-            <a:off x="3124200" y="2521641"/>
-            <a:ext cx="457200" cy="885610"/>
+          <a:xfrm>
+            <a:off x="3124200" y="3147961"/>
+            <a:ext cx="457200" cy="271514"/>
           </a:xfrm>
           <a:prstGeom prst="line">
             <a:avLst/>
@@ -7857,7 +7857,7 @@
         </p:nvCxnSpPr>
         <p:spPr>
           <a:xfrm>
-            <a:off x="3581400" y="2521641"/>
+            <a:off x="3581400" y="3419019"/>
             <a:ext cx="571500" cy="456"/>
           </a:xfrm>
           <a:prstGeom prst="line">
@@ -7883,6 +7883,93 @@
           </a:fontRef>
         </p:style>
       </p:cxnSp>
+      <p:cxnSp>
+        <p:nvCxnSpPr>
+          <p:cNvPr id="9" name="Straight Connector 8"/>
+          <p:cNvCxnSpPr/>
+          <p:nvPr/>
+        </p:nvCxnSpPr>
+        <p:spPr>
+          <a:xfrm flipV="1">
+            <a:off x="6265545" y="2824163"/>
+            <a:ext cx="0" cy="919249"/>
+          </a:xfrm>
+          <a:prstGeom prst="line">
+            <a:avLst/>
+          </a:prstGeom>
+          <a:ln>
+            <a:headEnd type="diamond" w="lg" len="lg"/>
+          </a:ln>
+        </p:spPr>
+        <p:style>
+          <a:lnRef idx="3">
+            <a:schemeClr val="accent6"/>
+          </a:lnRef>
+          <a:fillRef idx="0">
+            <a:schemeClr val="accent6"/>
+          </a:fillRef>
+          <a:effectRef idx="2">
+            <a:schemeClr val="accent6"/>
+          </a:effectRef>
+          <a:fontRef idx="minor">
+            <a:schemeClr val="tx1"/>
+          </a:fontRef>
+        </p:style>
+      </p:cxnSp>
+      <p:sp>
+        <p:nvSpPr>
+          <p:cNvPr id="8" name="Rectangle 7"/>
+          <p:cNvSpPr/>
+          <p:nvPr/>
+        </p:nvSpPr>
+        <p:spPr>
+          <a:xfrm>
+            <a:off x="4699635" y="2590800"/>
+            <a:ext cx="1575435" cy="828219"/>
+          </a:xfrm>
+          <a:prstGeom prst="rect">
+            <a:avLst/>
+          </a:prstGeom>
+          <a:ln>
+            <a:solidFill>
+              <a:schemeClr val="tx1"/>
+            </a:solidFill>
+          </a:ln>
+        </p:spPr>
+        <p:style>
+          <a:lnRef idx="1">
+            <a:schemeClr val="accent6"/>
+          </a:lnRef>
+          <a:fillRef idx="3">
+            <a:schemeClr val="accent6"/>
+          </a:fillRef>
+          <a:effectRef idx="2">
+            <a:schemeClr val="accent6"/>
+          </a:effectRef>
+          <a:fontRef idx="minor">
+            <a:schemeClr val="lt1"/>
+          </a:fontRef>
+        </p:style>
+        <p:txBody>
+          <a:bodyPr rtlCol="0" anchor="ctr"/>
+          <a:lstStyle/>
+          <a:p>
+            <a:r>
+              <a:rPr lang="en-US" sz="1000" b="1" dirty="0" smtClean="0">
+                <a:solidFill>
+                  <a:schemeClr val="tx1"/>
+                </a:solidFill>
+              </a:rPr>
+              <a:t>If comfortable death outcome is not achieved in first 3 days of hospitalization, expected LOS will double</a:t>
+            </a:r>
+            <a:endParaRPr lang="en-US" sz="1000" b="1" dirty="0">
+              <a:solidFill>
+                <a:schemeClr val="tx1"/>
+              </a:solidFill>
+            </a:endParaRPr>
+          </a:p>
+        </p:txBody>
+      </p:sp>
     </p:spTree>
     <p:extLst>
       <p:ext uri="{BB962C8B-B14F-4D97-AF65-F5344CB8AC3E}">

</xml_diff>

<commit_message>
getting ready for cycle 2 round 2
</commit_message>
<xml_diff>
--- a/HANDS/trunk/data/Design.pptx
+++ b/HANDS/trunk/data/Design.pptx
@@ -9,9 +9,10 @@
     <p:sldId id="269" r:id="rId3"/>
     <p:sldId id="272" r:id="rId4"/>
     <p:sldId id="267" r:id="rId5"/>
-    <p:sldId id="270" r:id="rId6"/>
-    <p:sldId id="268" r:id="rId7"/>
-    <p:sldId id="271" r:id="rId8"/>
+    <p:sldId id="273" r:id="rId6"/>
+    <p:sldId id="270" r:id="rId7"/>
+    <p:sldId id="268" r:id="rId8"/>
+    <p:sldId id="271" r:id="rId9"/>
   </p:sldIdLst>
   <p:sldSz cx="9144000" cy="6858000" type="screen4x3"/>
   <p:notesSz cx="6858000" cy="9144000"/>
@@ -147,7 +148,7 @@
           <a:p>
             <a:fld id="{46B0DD1D-ED37-4907-8AD7-C556D0397C4A}" type="datetimeFigureOut">
               <a:rPr lang="en-US" smtClean="0"/>
-              <a:t>9/6/2012</a:t>
+              <a:t>9/14/2012</a:t>
             </a:fld>
             <a:endParaRPr lang="en-US"/>
           </a:p>
@@ -303,7 +304,7 @@
           <a:p>
             <a:fld id="{46B0DD1D-ED37-4907-8AD7-C556D0397C4A}" type="datetimeFigureOut">
               <a:rPr lang="en-US" smtClean="0"/>
-              <a:t>9/6/2012</a:t>
+              <a:t>9/14/2012</a:t>
             </a:fld>
             <a:endParaRPr lang="en-US"/>
           </a:p>
@@ -1295,7 +1296,7 @@
           <a:p>
             <a:fld id="{46B0DD1D-ED37-4907-8AD7-C556D0397C4A}" type="datetimeFigureOut">
               <a:rPr lang="en-US" smtClean="0"/>
-              <a:t>9/6/2012</a:t>
+              <a:t>9/14/2012</a:t>
             </a:fld>
             <a:endParaRPr lang="en-US"/>
           </a:p>
@@ -2040,7 +2041,7 @@
           <a:p>
             <a:fld id="{46B0DD1D-ED37-4907-8AD7-C556D0397C4A}" type="datetimeFigureOut">
               <a:rPr lang="en-US" smtClean="0"/>
-              <a:t>9/6/2012</a:t>
+              <a:t>9/14/2012</a:t>
             </a:fld>
             <a:endParaRPr lang="en-US"/>
           </a:p>
@@ -2754,7 +2755,15 @@
                 <a:ea typeface="Tahoma" pitchFamily="34" charset="0"/>
                 <a:cs typeface="Tahoma" pitchFamily="34" charset="0"/>
               </a:rPr>
-              <a:t>NOC Level</a:t>
+              <a:t>NOC </a:t>
+            </a:r>
+            <a:r>
+              <a:rPr lang="en-US" sz="1000" dirty="0" smtClean="0">
+                <a:latin typeface="Tahoma" pitchFamily="34" charset="0"/>
+                <a:ea typeface="Tahoma" pitchFamily="34" charset="0"/>
+                <a:cs typeface="Tahoma" pitchFamily="34" charset="0"/>
+              </a:rPr>
+              <a:t>Rating</a:t>
             </a:r>
             <a:endParaRPr lang="en-US" sz="1000" dirty="0">
               <a:latin typeface="Tahoma" pitchFamily="34" charset="0"/>
@@ -6923,7 +6932,15 @@
                 <a:ea typeface="Tahoma" pitchFamily="34" charset="0"/>
                 <a:cs typeface="Tahoma" pitchFamily="34" charset="0"/>
               </a:rPr>
-              <a:t>NOC Level</a:t>
+              <a:t>NOC </a:t>
+            </a:r>
+            <a:r>
+              <a:rPr lang="en-US" sz="1000" dirty="0" smtClean="0">
+                <a:latin typeface="Tahoma" pitchFamily="34" charset="0"/>
+                <a:ea typeface="Tahoma" pitchFamily="34" charset="0"/>
+                <a:cs typeface="Tahoma" pitchFamily="34" charset="0"/>
+              </a:rPr>
+              <a:t>Rating</a:t>
             </a:r>
             <a:endParaRPr lang="en-US" sz="1000" dirty="0">
               <a:latin typeface="Tahoma" pitchFamily="34" charset="0"/>
@@ -7022,6 +7039,230 @@
 </file>
 
 <file path=ppt/slides/slide5.xml><?xml version="1.0" encoding="utf-8"?>
+<p:sld xmlns:a="http://schemas.openxmlformats.org/drawingml/2006/main" xmlns:r="http://schemas.openxmlformats.org/officeDocument/2006/relationships" xmlns:p="http://schemas.openxmlformats.org/presentationml/2006/main">
+  <p:cSld>
+    <p:spTree>
+      <p:nvGrpSpPr>
+        <p:cNvPr id="1" name=""/>
+        <p:cNvGrpSpPr/>
+        <p:nvPr/>
+      </p:nvGrpSpPr>
+      <p:grpSpPr>
+        <a:xfrm>
+          <a:off x="0" y="0"/>
+          <a:ext cx="0" cy="0"/>
+          <a:chOff x="0" y="0"/>
+          <a:chExt cx="0" cy="0"/>
+        </a:xfrm>
+      </p:grpSpPr>
+      <p:cxnSp>
+        <p:nvCxnSpPr>
+          <p:cNvPr id="10" name="Straight Connector 9"/>
+          <p:cNvCxnSpPr/>
+          <p:nvPr/>
+        </p:nvCxnSpPr>
+        <p:spPr>
+          <a:xfrm flipV="1">
+            <a:off x="4152900" y="2521641"/>
+            <a:ext cx="0" cy="1252640"/>
+          </a:xfrm>
+          <a:prstGeom prst="line">
+            <a:avLst/>
+          </a:prstGeom>
+          <a:ln>
+            <a:headEnd type="diamond" w="lg" len="lg"/>
+          </a:ln>
+        </p:spPr>
+        <p:style>
+          <a:lnRef idx="2">
+            <a:schemeClr val="accent1"/>
+          </a:lnRef>
+          <a:fillRef idx="0">
+            <a:schemeClr val="accent1"/>
+          </a:fillRef>
+          <a:effectRef idx="1">
+            <a:schemeClr val="accent1"/>
+          </a:effectRef>
+          <a:fontRef idx="minor">
+            <a:schemeClr val="tx1"/>
+          </a:fontRef>
+        </p:style>
+      </p:cxnSp>
+      <p:sp>
+        <p:nvSpPr>
+          <p:cNvPr id="6" name="TextBox 5"/>
+          <p:cNvSpPr txBox="1"/>
+          <p:nvPr/>
+        </p:nvSpPr>
+        <p:spPr>
+          <a:xfrm>
+            <a:off x="3124200" y="3944779"/>
+            <a:ext cx="3150870" cy="246221"/>
+          </a:xfrm>
+          <a:prstGeom prst="rect">
+            <a:avLst/>
+          </a:prstGeom>
+          <a:noFill/>
+        </p:spPr>
+        <p:txBody>
+          <a:bodyPr wrap="square" rtlCol="0">
+            <a:spAutoFit/>
+          </a:bodyPr>
+          <a:lstStyle/>
+          <a:p>
+            <a:pPr algn="ctr"/>
+            <a:r>
+              <a:rPr lang="en-US" sz="1000" dirty="0" smtClean="0">
+                <a:latin typeface="Tahoma" pitchFamily="34" charset="0"/>
+                <a:ea typeface="Tahoma" pitchFamily="34" charset="0"/>
+                <a:cs typeface="Tahoma" pitchFamily="34" charset="0"/>
+              </a:rPr>
+              <a:t>Hours since admission</a:t>
+            </a:r>
+            <a:endParaRPr lang="en-US" sz="1000" dirty="0">
+              <a:latin typeface="Tahoma" pitchFamily="34" charset="0"/>
+              <a:ea typeface="Tahoma" pitchFamily="34" charset="0"/>
+              <a:cs typeface="Tahoma" pitchFamily="34" charset="0"/>
+            </a:endParaRPr>
+          </a:p>
+        </p:txBody>
+      </p:sp>
+      <p:sp>
+        <p:nvSpPr>
+          <p:cNvPr id="7" name="TextBox 6"/>
+          <p:cNvSpPr txBox="1"/>
+          <p:nvPr/>
+        </p:nvSpPr>
+        <p:spPr>
+          <a:xfrm rot="16200000">
+            <a:off x="2202244" y="3040169"/>
+            <a:ext cx="1297357" cy="246221"/>
+          </a:xfrm>
+          <a:prstGeom prst="rect">
+            <a:avLst/>
+          </a:prstGeom>
+          <a:noFill/>
+        </p:spPr>
+        <p:txBody>
+          <a:bodyPr wrap="square" rtlCol="0">
+            <a:spAutoFit/>
+          </a:bodyPr>
+          <a:lstStyle/>
+          <a:p>
+            <a:pPr algn="ctr"/>
+            <a:r>
+              <a:rPr lang="en-US" sz="1000" dirty="0" smtClean="0">
+                <a:latin typeface="Tahoma" pitchFamily="34" charset="0"/>
+                <a:ea typeface="Tahoma" pitchFamily="34" charset="0"/>
+                <a:cs typeface="Tahoma" pitchFamily="34" charset="0"/>
+              </a:rPr>
+              <a:t>NOC </a:t>
+            </a:r>
+            <a:r>
+              <a:rPr lang="en-US" sz="1000" dirty="0" smtClean="0">
+                <a:latin typeface="Tahoma" pitchFamily="34" charset="0"/>
+                <a:ea typeface="Tahoma" pitchFamily="34" charset="0"/>
+                <a:cs typeface="Tahoma" pitchFamily="34" charset="0"/>
+              </a:rPr>
+              <a:t>Rating</a:t>
+            </a:r>
+            <a:endParaRPr lang="en-US" sz="1000" dirty="0">
+              <a:latin typeface="Tahoma" pitchFamily="34" charset="0"/>
+              <a:ea typeface="Tahoma" pitchFamily="34" charset="0"/>
+              <a:cs typeface="Tahoma" pitchFamily="34" charset="0"/>
+            </a:endParaRPr>
+          </a:p>
+        </p:txBody>
+      </p:sp>
+      <p:sp>
+        <p:nvSpPr>
+          <p:cNvPr id="8" name="TextBox 7"/>
+          <p:cNvSpPr txBox="1"/>
+          <p:nvPr/>
+        </p:nvSpPr>
+        <p:spPr>
+          <a:xfrm>
+            <a:off x="2588567" y="2390745"/>
+            <a:ext cx="459433" cy="200055"/>
+          </a:xfrm>
+          <a:prstGeom prst="rect">
+            <a:avLst/>
+          </a:prstGeom>
+          <a:noFill/>
+        </p:spPr>
+        <p:txBody>
+          <a:bodyPr wrap="square" rtlCol="0">
+            <a:spAutoFit/>
+          </a:bodyPr>
+          <a:lstStyle/>
+          <a:p>
+            <a:pPr algn="ctr"/>
+            <a:r>
+              <a:rPr lang="en-US" sz="700" b="1" dirty="0" smtClean="0">
+                <a:latin typeface="Tahoma" pitchFamily="34" charset="0"/>
+                <a:ea typeface="Tahoma" pitchFamily="34" charset="0"/>
+                <a:cs typeface="Tahoma" pitchFamily="34" charset="0"/>
+              </a:rPr>
+              <a:t>Better</a:t>
+            </a:r>
+            <a:endParaRPr lang="en-US" sz="700" b="1" dirty="0">
+              <a:latin typeface="Tahoma" pitchFamily="34" charset="0"/>
+              <a:ea typeface="Tahoma" pitchFamily="34" charset="0"/>
+              <a:cs typeface="Tahoma" pitchFamily="34" charset="0"/>
+            </a:endParaRPr>
+          </a:p>
+        </p:txBody>
+      </p:sp>
+      <p:cxnSp>
+        <p:nvCxnSpPr>
+          <p:cNvPr id="9" name="Straight Connector 8"/>
+          <p:cNvCxnSpPr/>
+          <p:nvPr/>
+        </p:nvCxnSpPr>
+        <p:spPr>
+          <a:xfrm>
+            <a:off x="3124200" y="3125578"/>
+            <a:ext cx="3150870" cy="0"/>
+          </a:xfrm>
+          <a:prstGeom prst="line">
+            <a:avLst/>
+          </a:prstGeom>
+          <a:ln w="38100" cap="rnd">
+            <a:solidFill>
+              <a:schemeClr val="tx1"/>
+            </a:solidFill>
+            <a:prstDash val="dash"/>
+          </a:ln>
+        </p:spPr>
+        <p:style>
+          <a:lnRef idx="1">
+            <a:schemeClr val="accent1"/>
+          </a:lnRef>
+          <a:fillRef idx="0">
+            <a:schemeClr val="accent1"/>
+          </a:fillRef>
+          <a:effectRef idx="0">
+            <a:schemeClr val="accent1"/>
+          </a:effectRef>
+          <a:fontRef idx="minor">
+            <a:schemeClr val="tx1"/>
+          </a:fontRef>
+        </p:style>
+      </p:cxnSp>
+    </p:spTree>
+    <p:extLst>
+      <p:ext uri="{BB962C8B-B14F-4D97-AF65-F5344CB8AC3E}">
+        <p14:creationId xmlns:p14="http://schemas.microsoft.com/office/powerpoint/2010/main" val="3285608515"/>
+      </p:ext>
+    </p:extLst>
+  </p:cSld>
+  <p:clrMapOvr>
+    <a:masterClrMapping/>
+  </p:clrMapOvr>
+</p:sld>
+</file>
+
+<file path=ppt/slides/slide6.xml><?xml version="1.0" encoding="utf-8"?>
 <p:sld xmlns:a="http://schemas.openxmlformats.org/drawingml/2006/main" xmlns:r="http://schemas.openxmlformats.org/officeDocument/2006/relationships" xmlns:p="http://schemas.openxmlformats.org/presentationml/2006/main">
   <p:cSld>
     <p:spTree>
@@ -7609,7 +7850,7 @@
 </p:sld>
 </file>
 
-<file path=ppt/slides/slide6.xml><?xml version="1.0" encoding="utf-8"?>
+<file path=ppt/slides/slide7.xml><?xml version="1.0" encoding="utf-8"?>
 <p:sld xmlns:a="http://schemas.openxmlformats.org/drawingml/2006/main" xmlns:r="http://schemas.openxmlformats.org/officeDocument/2006/relationships" xmlns:p="http://schemas.openxmlformats.org/presentationml/2006/main">
   <p:cSld>
     <p:spTree>
@@ -7761,7 +8002,15 @@
                 <a:ea typeface="Tahoma" pitchFamily="34" charset="0"/>
                 <a:cs typeface="Tahoma" pitchFamily="34" charset="0"/>
               </a:rPr>
-              <a:t>NOC Level</a:t>
+              <a:t>NOC </a:t>
+            </a:r>
+            <a:r>
+              <a:rPr lang="en-US" sz="1000" dirty="0" smtClean="0">
+                <a:latin typeface="Tahoma" pitchFamily="34" charset="0"/>
+                <a:ea typeface="Tahoma" pitchFamily="34" charset="0"/>
+                <a:cs typeface="Tahoma" pitchFamily="34" charset="0"/>
+              </a:rPr>
+              <a:t>Rating</a:t>
             </a:r>
             <a:endParaRPr lang="en-US" sz="1000" dirty="0">
               <a:latin typeface="Tahoma" pitchFamily="34" charset="0"/>
@@ -7898,6 +8147,9 @@
             <a:avLst/>
           </a:prstGeom>
           <a:ln>
+            <a:solidFill>
+              <a:srgbClr val="FF0000"/>
+            </a:solidFill>
             <a:headEnd type="diamond" w="lg" len="lg"/>
           </a:ln>
         </p:spPr>
@@ -7930,9 +8182,12 @@
           <a:prstGeom prst="rect">
             <a:avLst/>
           </a:prstGeom>
-          <a:ln>
+          <a:solidFill>
+            <a:srgbClr val="FFFF99"/>
+          </a:solidFill>
+          <a:ln w="28575">
             <a:solidFill>
-              <a:schemeClr val="tx1"/>
+              <a:srgbClr val="FF0000"/>
             </a:solidFill>
           </a:ln>
         </p:spPr>
@@ -7960,7 +8215,7 @@
                   <a:schemeClr val="tx1"/>
                 </a:solidFill>
               </a:rPr>
-              <a:t>If comfortable death outcome is not achieved in first 3 days of hospitalization, expected LOS will double</a:t>
+              <a:t>If expected NOC rating is not met within 72 hours of admission, LOS will double</a:t>
             </a:r>
             <a:endParaRPr lang="en-US" sz="1000" b="1" dirty="0">
               <a:solidFill>
@@ -7983,7 +8238,7 @@
 </p:sld>
 </file>
 
-<file path=ppt/slides/slide7.xml><?xml version="1.0" encoding="utf-8"?>
+<file path=ppt/slides/slide8.xml><?xml version="1.0" encoding="utf-8"?>
 <p:sld xmlns:a="http://schemas.openxmlformats.org/drawingml/2006/main" xmlns:r="http://schemas.openxmlformats.org/officeDocument/2006/relationships" xmlns:p="http://schemas.openxmlformats.org/presentationml/2006/main">
   <p:cSld>
     <p:spTree>

</xml_diff>

<commit_message>
committing changes for cycle 2 round 3
</commit_message>
<xml_diff>
--- a/HANDS/trunk/data/Design.pptx
+++ b/HANDS/trunk/data/Design.pptx
@@ -148,7 +148,7 @@
           <a:p>
             <a:fld id="{46B0DD1D-ED37-4907-8AD7-C556D0397C4A}" type="datetimeFigureOut">
               <a:rPr lang="en-US" smtClean="0"/>
-              <a:t>9/14/2012</a:t>
+              <a:t>11/8/2012</a:t>
             </a:fld>
             <a:endParaRPr lang="en-US"/>
           </a:p>
@@ -304,7 +304,7 @@
           <a:p>
             <a:fld id="{46B0DD1D-ED37-4907-8AD7-C556D0397C4A}" type="datetimeFigureOut">
               <a:rPr lang="en-US" smtClean="0"/>
-              <a:t>9/14/2012</a:t>
+              <a:t>11/8/2012</a:t>
             </a:fld>
             <a:endParaRPr lang="en-US"/>
           </a:p>
@@ -1296,7 +1296,7 @@
           <a:p>
             <a:fld id="{46B0DD1D-ED37-4907-8AD7-C556D0397C4A}" type="datetimeFigureOut">
               <a:rPr lang="en-US" smtClean="0"/>
-              <a:t>9/14/2012</a:t>
+              <a:t>11/8/2012</a:t>
             </a:fld>
             <a:endParaRPr lang="en-US"/>
           </a:p>
@@ -2041,7 +2041,7 @@
           <a:p>
             <a:fld id="{46B0DD1D-ED37-4907-8AD7-C556D0397C4A}" type="datetimeFigureOut">
               <a:rPr lang="en-US" smtClean="0"/>
-              <a:t>9/14/2012</a:t>
+              <a:t>11/8/2012</a:t>
             </a:fld>
             <a:endParaRPr lang="en-US"/>
           </a:p>
@@ -2755,15 +2755,7 @@
                 <a:ea typeface="Tahoma" pitchFamily="34" charset="0"/>
                 <a:cs typeface="Tahoma" pitchFamily="34" charset="0"/>
               </a:rPr>
-              <a:t>NOC </a:t>
-            </a:r>
-            <a:r>
-              <a:rPr lang="en-US" sz="1000" dirty="0" smtClean="0">
-                <a:latin typeface="Tahoma" pitchFamily="34" charset="0"/>
-                <a:ea typeface="Tahoma" pitchFamily="34" charset="0"/>
-                <a:cs typeface="Tahoma" pitchFamily="34" charset="0"/>
-              </a:rPr>
-              <a:t>Rating</a:t>
+              <a:t>NOC Rating</a:t>
             </a:r>
             <a:endParaRPr lang="en-US" sz="1000" dirty="0">
               <a:latin typeface="Tahoma" pitchFamily="34" charset="0"/>
@@ -3068,6 +3060,45 @@
               <a:t>Actual</a:t>
             </a:r>
             <a:endParaRPr lang="en-US" sz="800" dirty="0">
+              <a:latin typeface="Tahoma" pitchFamily="34" charset="0"/>
+              <a:ea typeface="Tahoma" pitchFamily="34" charset="0"/>
+              <a:cs typeface="Tahoma" pitchFamily="34" charset="0"/>
+            </a:endParaRPr>
+          </a:p>
+        </p:txBody>
+      </p:sp>
+      <p:sp>
+        <p:nvSpPr>
+          <p:cNvPr id="22" name="TextBox 21"/>
+          <p:cNvSpPr txBox="1"/>
+          <p:nvPr/>
+        </p:nvSpPr>
+        <p:spPr>
+          <a:xfrm>
+            <a:off x="3138174" y="2244546"/>
+            <a:ext cx="3150870" cy="246221"/>
+          </a:xfrm>
+          <a:prstGeom prst="rect">
+            <a:avLst/>
+          </a:prstGeom>
+          <a:noFill/>
+        </p:spPr>
+        <p:txBody>
+          <a:bodyPr wrap="square" rtlCol="0">
+            <a:spAutoFit/>
+          </a:bodyPr>
+          <a:lstStyle/>
+          <a:p>
+            <a:pPr algn="ctr"/>
+            <a:r>
+              <a:rPr lang="en-US" sz="1000" b="1" dirty="0" smtClean="0">
+                <a:latin typeface="Tahoma" pitchFamily="34" charset="0"/>
+                <a:ea typeface="Tahoma" pitchFamily="34" charset="0"/>
+                <a:cs typeface="Tahoma" pitchFamily="34" charset="0"/>
+              </a:rPr>
+              <a:t>Pain Level</a:t>
+            </a:r>
+            <a:endParaRPr lang="en-US" sz="1000" b="1" dirty="0">
               <a:latin typeface="Tahoma" pitchFamily="34" charset="0"/>
               <a:ea typeface="Tahoma" pitchFamily="34" charset="0"/>
               <a:cs typeface="Tahoma" pitchFamily="34" charset="0"/>
@@ -6932,15 +6963,7 @@
                 <a:ea typeface="Tahoma" pitchFamily="34" charset="0"/>
                 <a:cs typeface="Tahoma" pitchFamily="34" charset="0"/>
               </a:rPr>
-              <a:t>NOC </a:t>
-            </a:r>
-            <a:r>
-              <a:rPr lang="en-US" sz="1000" dirty="0" smtClean="0">
-                <a:latin typeface="Tahoma" pitchFamily="34" charset="0"/>
-                <a:ea typeface="Tahoma" pitchFamily="34" charset="0"/>
-                <a:cs typeface="Tahoma" pitchFamily="34" charset="0"/>
-              </a:rPr>
-              <a:t>Rating</a:t>
+              <a:t>NOC Rating</a:t>
             </a:r>
             <a:endParaRPr lang="en-US" sz="1000" dirty="0">
               <a:latin typeface="Tahoma" pitchFamily="34" charset="0"/>
@@ -7025,6 +7048,45 @@
           </a:fontRef>
         </p:style>
       </p:cxnSp>
+      <p:sp>
+        <p:nvSpPr>
+          <p:cNvPr id="11" name="TextBox 10"/>
+          <p:cNvSpPr txBox="1"/>
+          <p:nvPr/>
+        </p:nvSpPr>
+        <p:spPr>
+          <a:xfrm>
+            <a:off x="3138174" y="2244546"/>
+            <a:ext cx="3150870" cy="246221"/>
+          </a:xfrm>
+          <a:prstGeom prst="rect">
+            <a:avLst/>
+          </a:prstGeom>
+          <a:noFill/>
+        </p:spPr>
+        <p:txBody>
+          <a:bodyPr wrap="square" rtlCol="0">
+            <a:spAutoFit/>
+          </a:bodyPr>
+          <a:lstStyle/>
+          <a:p>
+            <a:pPr algn="ctr"/>
+            <a:r>
+              <a:rPr lang="en-US" sz="1000" b="1" dirty="0" smtClean="0">
+                <a:latin typeface="Tahoma" pitchFamily="34" charset="0"/>
+                <a:ea typeface="Tahoma" pitchFamily="34" charset="0"/>
+                <a:cs typeface="Tahoma" pitchFamily="34" charset="0"/>
+              </a:rPr>
+              <a:t>Anxiety Level</a:t>
+            </a:r>
+            <a:endParaRPr lang="en-US" sz="1000" b="1" dirty="0">
+              <a:latin typeface="Tahoma" pitchFamily="34" charset="0"/>
+              <a:ea typeface="Tahoma" pitchFamily="34" charset="0"/>
+              <a:cs typeface="Tahoma" pitchFamily="34" charset="0"/>
+            </a:endParaRPr>
+          </a:p>
+        </p:txBody>
+      </p:sp>
     </p:spTree>
     <p:extLst>
       <p:ext uri="{BB962C8B-B14F-4D97-AF65-F5344CB8AC3E}">
@@ -7156,15 +7218,7 @@
                 <a:ea typeface="Tahoma" pitchFamily="34" charset="0"/>
                 <a:cs typeface="Tahoma" pitchFamily="34" charset="0"/>
               </a:rPr>
-              <a:t>NOC </a:t>
-            </a:r>
-            <a:r>
-              <a:rPr lang="en-US" sz="1000" dirty="0" smtClean="0">
-                <a:latin typeface="Tahoma" pitchFamily="34" charset="0"/>
-                <a:ea typeface="Tahoma" pitchFamily="34" charset="0"/>
-                <a:cs typeface="Tahoma" pitchFamily="34" charset="0"/>
-              </a:rPr>
-              <a:t>Rating</a:t>
+              <a:t>NOC Rating</a:t>
             </a:r>
             <a:endParaRPr lang="en-US" sz="1000" dirty="0">
               <a:latin typeface="Tahoma" pitchFamily="34" charset="0"/>
@@ -8002,15 +8056,7 @@
                 <a:ea typeface="Tahoma" pitchFamily="34" charset="0"/>
                 <a:cs typeface="Tahoma" pitchFamily="34" charset="0"/>
               </a:rPr>
-              <a:t>NOC </a:t>
-            </a:r>
-            <a:r>
-              <a:rPr lang="en-US" sz="1000" dirty="0" smtClean="0">
-                <a:latin typeface="Tahoma" pitchFamily="34" charset="0"/>
-                <a:ea typeface="Tahoma" pitchFamily="34" charset="0"/>
-                <a:cs typeface="Tahoma" pitchFamily="34" charset="0"/>
-              </a:rPr>
-              <a:t>Rating</a:t>
+              <a:t>NOC Rating</a:t>
             </a:r>
             <a:endParaRPr lang="en-US" sz="1000" dirty="0">
               <a:latin typeface="Tahoma" pitchFamily="34" charset="0"/>
@@ -8221,6 +8267,45 @@
               <a:solidFill>
                 <a:schemeClr val="tx1"/>
               </a:solidFill>
+            </a:endParaRPr>
+          </a:p>
+        </p:txBody>
+      </p:sp>
+      <p:sp>
+        <p:nvSpPr>
+          <p:cNvPr id="13" name="TextBox 12"/>
+          <p:cNvSpPr txBox="1"/>
+          <p:nvPr/>
+        </p:nvSpPr>
+        <p:spPr>
+          <a:xfrm>
+            <a:off x="3138174" y="2244546"/>
+            <a:ext cx="3150870" cy="246221"/>
+          </a:xfrm>
+          <a:prstGeom prst="rect">
+            <a:avLst/>
+          </a:prstGeom>
+          <a:noFill/>
+        </p:spPr>
+        <p:txBody>
+          <a:bodyPr wrap="square" rtlCol="0">
+            <a:spAutoFit/>
+          </a:bodyPr>
+          <a:lstStyle/>
+          <a:p>
+            <a:pPr algn="ctr"/>
+            <a:r>
+              <a:rPr lang="en-US" sz="1000" b="1" dirty="0" smtClean="0">
+                <a:latin typeface="Tahoma" pitchFamily="34" charset="0"/>
+                <a:ea typeface="Tahoma" pitchFamily="34" charset="0"/>
+                <a:cs typeface="Tahoma" pitchFamily="34" charset="0"/>
+              </a:rPr>
+              <a:t>Anxiety Level</a:t>
+            </a:r>
+            <a:endParaRPr lang="en-US" sz="1000" b="1" dirty="0">
+              <a:latin typeface="Tahoma" pitchFamily="34" charset="0"/>
+              <a:ea typeface="Tahoma" pitchFamily="34" charset="0"/>
+              <a:cs typeface="Tahoma" pitchFamily="34" charset="0"/>
             </a:endParaRPr>
           </a:p>
         </p:txBody>

</xml_diff>

<commit_message>
fixes and changes for cycle 3 round 2
</commit_message>
<xml_diff>
--- a/HANDS/trunk/data/Design.pptx
+++ b/HANDS/trunk/data/Design.pptx
@@ -146,7 +146,7 @@
           <a:p>
             <a:fld id="{46B0DD1D-ED37-4907-8AD7-C556D0397C4A}" type="datetimeFigureOut">
               <a:rPr lang="en-US" smtClean="0"/>
-              <a:t>2/11/2013</a:t>
+              <a:t>2/18/2013</a:t>
             </a:fld>
             <a:endParaRPr lang="en-US"/>
           </a:p>
@@ -302,7 +302,7 @@
           <a:p>
             <a:fld id="{46B0DD1D-ED37-4907-8AD7-C556D0397C4A}" type="datetimeFigureOut">
               <a:rPr lang="en-US" smtClean="0"/>
-              <a:t>2/11/2013</a:t>
+              <a:t>2/18/2013</a:t>
             </a:fld>
             <a:endParaRPr lang="en-US"/>
           </a:p>
@@ -1294,7 +1294,7 @@
           <a:p>
             <a:fld id="{46B0DD1D-ED37-4907-8AD7-C556D0397C4A}" type="datetimeFigureOut">
               <a:rPr lang="en-US" smtClean="0"/>
-              <a:t>2/11/2013</a:t>
+              <a:t>2/18/2013</a:t>
             </a:fld>
             <a:endParaRPr lang="en-US"/>
           </a:p>
@@ -2039,7 +2039,7 @@
           <a:p>
             <a:fld id="{46B0DD1D-ED37-4907-8AD7-C556D0397C4A}" type="datetimeFigureOut">
               <a:rPr lang="en-US" smtClean="0"/>
-              <a:t>2/11/2013</a:t>
+              <a:t>2/18/2013</a:t>
             </a:fld>
             <a:endParaRPr lang="en-US"/>
           </a:p>
@@ -2414,8 +2414,8 @@
         </p:nvCxnSpPr>
         <p:spPr>
           <a:xfrm>
-            <a:off x="3124200" y="3031331"/>
-            <a:ext cx="518160" cy="375920"/>
+            <a:off x="3138174" y="3124200"/>
+            <a:ext cx="504186" cy="283051"/>
           </a:xfrm>
           <a:prstGeom prst="line">
             <a:avLst/>
@@ -2449,7 +2449,7 @@
         <p:spPr>
           <a:xfrm>
             <a:off x="3642360" y="3407251"/>
-            <a:ext cx="510540" cy="361950"/>
+            <a:ext cx="510540" cy="326549"/>
           </a:xfrm>
           <a:prstGeom prst="line">
             <a:avLst/>
@@ -2481,9 +2481,9 @@
           <p:nvPr/>
         </p:nvCxnSpPr>
         <p:spPr>
-          <a:xfrm flipV="1">
-            <a:off x="4152900" y="3588226"/>
-            <a:ext cx="521970" cy="180975"/>
+          <a:xfrm>
+            <a:off x="4153654" y="3733800"/>
+            <a:ext cx="521216" cy="0"/>
           </a:xfrm>
           <a:prstGeom prst="line">
             <a:avLst/>
@@ -2517,8 +2517,8 @@
         </p:nvCxnSpPr>
         <p:spPr>
           <a:xfrm>
-            <a:off x="4674870" y="3588227"/>
-            <a:ext cx="529590" cy="180974"/>
+            <a:off x="4674870" y="3733800"/>
+            <a:ext cx="529590" cy="0"/>
           </a:xfrm>
           <a:prstGeom prst="line">
             <a:avLst/>
@@ -2553,7 +2553,7 @@
         <p:spPr>
           <a:xfrm flipV="1">
             <a:off x="5204460" y="3407251"/>
-            <a:ext cx="502741" cy="361950"/>
+            <a:ext cx="502741" cy="326549"/>
           </a:xfrm>
           <a:prstGeom prst="line">
             <a:avLst/>

</xml_diff>

<commit_message>
NEW: prototype changes for cycle 3 round 2 (revised)
</commit_message>
<xml_diff>
--- a/HANDS/trunk/data/Design.pptx
+++ b/HANDS/trunk/data/Design.pptx
@@ -146,7 +146,7 @@
           <a:p>
             <a:fld id="{46B0DD1D-ED37-4907-8AD7-C556D0397C4A}" type="datetimeFigureOut">
               <a:rPr lang="en-US" smtClean="0"/>
-              <a:t>2/18/2013</a:t>
+              <a:t>2/25/2013</a:t>
             </a:fld>
             <a:endParaRPr lang="en-US"/>
           </a:p>
@@ -302,7 +302,7 @@
           <a:p>
             <a:fld id="{46B0DD1D-ED37-4907-8AD7-C556D0397C4A}" type="datetimeFigureOut">
               <a:rPr lang="en-US" smtClean="0"/>
-              <a:t>2/18/2013</a:t>
+              <a:t>2/25/2013</a:t>
             </a:fld>
             <a:endParaRPr lang="en-US"/>
           </a:p>
@@ -1294,7 +1294,7 @@
           <a:p>
             <a:fld id="{46B0DD1D-ED37-4907-8AD7-C556D0397C4A}" type="datetimeFigureOut">
               <a:rPr lang="en-US" smtClean="0"/>
-              <a:t>2/18/2013</a:t>
+              <a:t>2/25/2013</a:t>
             </a:fld>
             <a:endParaRPr lang="en-US"/>
           </a:p>
@@ -2039,7 +2039,7 @@
           <a:p>
             <a:fld id="{46B0DD1D-ED37-4907-8AD7-C556D0397C4A}" type="datetimeFigureOut">
               <a:rPr lang="en-US" smtClean="0"/>
-              <a:t>2/18/2013</a:t>
+              <a:t>2/25/2013</a:t>
             </a:fld>
             <a:endParaRPr lang="en-US"/>
           </a:p>
@@ -4067,6 +4067,13 @@
   <p:clrMapOvr>
     <a:masterClrMapping/>
   </p:clrMapOvr>
+  <p:timing>
+    <p:tnLst>
+      <p:par>
+        <p:cTn id="1" dur="indefinite" restart="never" nodeType="tmRoot"/>
+      </p:par>
+    </p:tnLst>
+  </p:timing>
 </p:sld>
 </file>
 
@@ -4152,10 +4159,7 @@
             <a:avLst/>
           </a:prstGeom>
           <a:solidFill>
-            <a:schemeClr val="tx1">
-              <a:lumMod val="75000"/>
-              <a:lumOff val="25000"/>
-            </a:schemeClr>
+            <a:srgbClr val="0D32CD"/>
           </a:solidFill>
           <a:ln>
             <a:noFill/>
@@ -4183,7 +4187,7 @@
           <a:p>
             <a:pPr algn="ctr"/>
             <a:r>
-              <a:rPr lang="en-US" sz="7200" b="1" dirty="0" err="1"/>
+              <a:rPr lang="en-US" sz="7200" b="1" dirty="0"/>
               <a:t>S</a:t>
             </a:r>
             <a:endParaRPr lang="en-US" b="1" dirty="0"/>
@@ -4205,7 +4209,10 @@
             <a:avLst/>
           </a:prstGeom>
           <a:solidFill>
-            <a:schemeClr val="bg1"/>
+            <a:schemeClr val="tx1">
+              <a:lumMod val="95000"/>
+              <a:lumOff val="5000"/>
+            </a:schemeClr>
           </a:solidFill>
           <a:ln w="57150">
             <a:solidFill>
@@ -4237,14 +4244,14 @@
             <a:r>
               <a:rPr lang="en-US" sz="7200" b="1" dirty="0" err="1">
                 <a:solidFill>
-                  <a:schemeClr val="tx1"/>
+                  <a:schemeClr val="bg1"/>
                 </a:solidFill>
               </a:rPr>
               <a:t>T</a:t>
             </a:r>
             <a:endParaRPr lang="en-US" b="1" dirty="0">
               <a:solidFill>
-                <a:schemeClr val="tx1"/>
+                <a:schemeClr val="bg1"/>
               </a:solidFill>
             </a:endParaRPr>
           </a:p>
@@ -4260,6 +4267,13 @@
   <p:clrMapOvr>
     <a:masterClrMapping/>
   </p:clrMapOvr>
+  <p:timing>
+    <p:tnLst>
+      <p:par>
+        <p:cTn id="1" dur="indefinite" restart="never" nodeType="tmRoot"/>
+      </p:par>
+    </p:tnLst>
+  </p:timing>
 </p:sld>
 </file>
 
@@ -5035,7 +5049,7 @@
           </p:cNvPicPr>
           <p:nvPr/>
         </p:nvPicPr>
-        <p:blipFill rotWithShape="1">
+        <p:blipFill>
           <a:blip r:embed="rId9" cstate="print">
             <a:extLst>
               <a:ext uri="{28A0092B-C50C-407E-A947-70E740481C1C}">
@@ -5043,13 +5057,14 @@
               </a:ext>
             </a:extLst>
           </a:blip>
-          <a:srcRect l="23223" t="23361" r="23719" b="34728"/>
-          <a:stretch/>
+          <a:stretch>
+            <a:fillRect/>
+          </a:stretch>
         </p:blipFill>
         <p:spPr bwMode="auto">
           <a:xfrm>
-            <a:off x="53166" y="676275"/>
-            <a:ext cx="522314" cy="517433"/>
+            <a:off x="53569" y="676275"/>
+            <a:ext cx="521507" cy="517433"/>
           </a:xfrm>
           <a:prstGeom prst="rect">
             <a:avLst/>
@@ -5097,7 +5112,7 @@
           </p:cNvPicPr>
           <p:nvPr/>
         </p:nvPicPr>
-        <p:blipFill rotWithShape="1">
+        <p:blipFill>
           <a:blip r:embed="rId10" cstate="print">
             <a:extLst>
               <a:ext uri="{28A0092B-C50C-407E-A947-70E740481C1C}">
@@ -5105,13 +5120,14 @@
               </a:ext>
             </a:extLst>
           </a:blip>
-          <a:srcRect l="23085" t="20321" r="22002" b="35074"/>
-          <a:stretch/>
+          <a:stretch>
+            <a:fillRect/>
+          </a:stretch>
         </p:blipFill>
         <p:spPr bwMode="auto">
           <a:xfrm>
-            <a:off x="69722" y="1242403"/>
-            <a:ext cx="508195" cy="510197"/>
+            <a:off x="69722" y="1246958"/>
+            <a:ext cx="508195" cy="501087"/>
           </a:xfrm>
           <a:prstGeom prst="rect">
             <a:avLst/>
@@ -5161,6 +5177,13 @@
   <p:clrMapOvr>
     <a:masterClrMapping/>
   </p:clrMapOvr>
+  <p:timing>
+    <p:tnLst>
+      <p:par>
+        <p:cTn id="1" dur="indefinite" restart="never" nodeType="tmRoot"/>
+      </p:par>
+    </p:tnLst>
+  </p:timing>
 </p:sld>
 </file>
 

</xml_diff>

<commit_message>
(WIP) cycle 4 changes: working on dynamic graph and patient trends update logic
</commit_message>
<xml_diff>
--- a/HANDS/trunk/data/Design.pptx
+++ b/HANDS/trunk/data/Design.pptx
@@ -111,6 +111,22 @@
       </a:defRPr>
     </a:lvl9pPr>
   </p:defaultTextStyle>
+  <p:extLst>
+    <p:ext uri="{EFAFB233-063F-42B5-8137-9DF3F51BA10A}">
+      <p15:sldGuideLst xmlns:p15="http://schemas.microsoft.com/office/powerpoint/2012/main">
+        <p15:guide id="1" orient="horz" pos="2160">
+          <p15:clr>
+            <a:srgbClr val="A4A3A4"/>
+          </p15:clr>
+        </p15:guide>
+        <p15:guide id="2" pos="2880">
+          <p15:clr>
+            <a:srgbClr val="A4A3A4"/>
+          </p15:clr>
+        </p15:guide>
+      </p15:sldGuideLst>
+    </p:ext>
+  </p:extLst>
 </p:presentation>
 </file>
 
@@ -148,7 +164,7 @@
           <a:p>
             <a:fld id="{46B0DD1D-ED37-4907-8AD7-C556D0397C4A}" type="datetimeFigureOut">
               <a:rPr lang="en-US" smtClean="0"/>
-              <a:t>5/15/2013</a:t>
+              <a:t>3/3/2014</a:t>
             </a:fld>
             <a:endParaRPr lang="en-US"/>
           </a:p>
@@ -304,7 +320,7 @@
           <a:p>
             <a:fld id="{46B0DD1D-ED37-4907-8AD7-C556D0397C4A}" type="datetimeFigureOut">
               <a:rPr lang="en-US" smtClean="0"/>
-              <a:t>5/15/2013</a:t>
+              <a:t>3/3/2014</a:t>
             </a:fld>
             <a:endParaRPr lang="en-US"/>
           </a:p>
@@ -1367,7 +1383,7 @@
           <a:p>
             <a:fld id="{46B0DD1D-ED37-4907-8AD7-C556D0397C4A}" type="datetimeFigureOut">
               <a:rPr lang="en-US" smtClean="0"/>
-              <a:t>5/15/2013</a:t>
+              <a:t>3/3/2014</a:t>
             </a:fld>
             <a:endParaRPr lang="en-US"/>
           </a:p>
@@ -1945,8 +1961,8 @@
         </p:nvSpPr>
         <p:spPr>
           <a:xfrm>
-            <a:off x="3895644" y="3804106"/>
-            <a:ext cx="476412" cy="246221"/>
+            <a:off x="3975794" y="3804106"/>
+            <a:ext cx="316112" cy="215444"/>
           </a:xfrm>
           <a:prstGeom prst="rect">
             <a:avLst/>
@@ -1961,14 +1977,14 @@
           <a:p>
             <a:pPr algn="ctr"/>
             <a:r>
-              <a:rPr lang="en-US" sz="1000" b="1" u="sng" dirty="0" smtClean="0">
+              <a:rPr lang="en-US" sz="800" b="1" u="none" dirty="0" smtClean="0">
                 <a:latin typeface="Tahoma" pitchFamily="34" charset="0"/>
                 <a:ea typeface="Tahoma" pitchFamily="34" charset="0"/>
                 <a:cs typeface="Tahoma" pitchFamily="34" charset="0"/>
               </a:rPr>
-              <a:t>Now</a:t>
-            </a:r>
-            <a:endParaRPr lang="en-US" sz="1000" b="1" u="sng" dirty="0">
+              <a:t>24</a:t>
+            </a:r>
+            <a:endParaRPr lang="en-US" sz="800" b="1" u="none" dirty="0">
               <a:latin typeface="Tahoma" pitchFamily="34" charset="0"/>
               <a:ea typeface="Tahoma" pitchFamily="34" charset="0"/>
               <a:cs typeface="Tahoma" pitchFamily="34" charset="0"/>
@@ -2359,7 +2375,7 @@
           <a:p>
             <a:fld id="{46B0DD1D-ED37-4907-8AD7-C556D0397C4A}" type="datetimeFigureOut">
               <a:rPr lang="en-US" smtClean="0"/>
-              <a:t>5/15/2013</a:t>
+              <a:t>3/3/2014</a:t>
             </a:fld>
             <a:endParaRPr lang="en-US"/>
           </a:p>
@@ -3351,7 +3367,7 @@
           <a:p>
             <a:fld id="{46B0DD1D-ED37-4907-8AD7-C556D0397C4A}" type="datetimeFigureOut">
               <a:rPr lang="en-US" smtClean="0"/>
-              <a:t>5/15/2013</a:t>
+              <a:t>3/3/2014</a:t>
             </a:fld>
             <a:endParaRPr lang="en-US"/>
           </a:p>
@@ -4096,7 +4112,7 @@
           <a:p>
             <a:fld id="{46B0DD1D-ED37-4907-8AD7-C556D0397C4A}" type="datetimeFigureOut">
               <a:rPr lang="en-US" smtClean="0"/>
-              <a:t>5/15/2013</a:t>
+              <a:t>3/3/2014</a:t>
             </a:fld>
             <a:endParaRPr lang="en-US"/>
           </a:p>
@@ -6885,16 +6901,6 @@
               </a:rPr>
               <a:t>If no plan </a:t>
             </a:r>
-            <a:endParaRPr lang="en-US" sz="1100" dirty="0" smtClean="0">
-              <a:solidFill>
-                <a:schemeClr val="accent2">
-                  <a:lumMod val="50000"/>
-                </a:schemeClr>
-              </a:solidFill>
-              <a:latin typeface="Tahoma" pitchFamily="34" charset="0"/>
-              <a:ea typeface="Tahoma" pitchFamily="34" charset="0"/>
-              <a:cs typeface="Tahoma" pitchFamily="34" charset="0"/>
-            </a:endParaRPr>
           </a:p>
           <a:p>
             <a:r>
@@ -6956,14 +6962,6 @@
               </a:rPr>
               <a:t>If treated </a:t>
             </a:r>
-            <a:endParaRPr lang="en-US" sz="1050" dirty="0" smtClean="0">
-              <a:solidFill>
-                <a:srgbClr val="007434"/>
-              </a:solidFill>
-              <a:latin typeface="Tahoma" pitchFamily="34" charset="0"/>
-              <a:ea typeface="Tahoma" pitchFamily="34" charset="0"/>
-              <a:cs typeface="Tahoma" pitchFamily="34" charset="0"/>
-            </a:endParaRPr>
           </a:p>
           <a:p>
             <a:r>
@@ -7684,7 +7682,7 @@
         </p:nvCxnSpPr>
         <p:spPr>
           <a:xfrm flipV="1">
-            <a:off x="4152900" y="2521641"/>
+            <a:off x="8072893" y="1662900"/>
             <a:ext cx="0" cy="1252640"/>
           </a:xfrm>
           <a:prstGeom prst="line">
@@ -7718,7 +7716,7 @@
         <p:spPr>
           <a:xfrm>
             <a:off x="2209800" y="2813447"/>
-            <a:ext cx="802696" cy="600164"/>
+            <a:ext cx="802696" cy="461665"/>
           </a:xfrm>
           <a:prstGeom prst="rect">
             <a:avLst/>
@@ -7749,20 +7747,17 @@
                 <a:ea typeface="Tahoma" pitchFamily="34" charset="0"/>
                 <a:cs typeface="Tahoma" pitchFamily="34" charset="0"/>
               </a:rPr>
-              <a:t> Rating</a:t>
-            </a:r>
-          </a:p>
-          <a:p>
-            <a:pPr algn="ctr"/>
-            <a:r>
-              <a:rPr lang="en-US" sz="900" dirty="0" smtClean="0">
+              <a:t> </a:t>
+            </a:r>
+            <a:r>
+              <a:rPr lang="en-US" sz="1200" dirty="0" smtClean="0">
                 <a:latin typeface="Tahoma" pitchFamily="34" charset="0"/>
                 <a:ea typeface="Tahoma" pitchFamily="34" charset="0"/>
                 <a:cs typeface="Tahoma" pitchFamily="34" charset="0"/>
               </a:rPr>
-              <a:t>(goal is 5)</a:t>
-            </a:r>
-            <a:endParaRPr lang="en-US" sz="900" dirty="0">
+              <a:t>Rating</a:t>
+            </a:r>
+            <a:endParaRPr lang="en-US" sz="1200" dirty="0" smtClean="0">
               <a:latin typeface="Tahoma" pitchFamily="34" charset="0"/>
               <a:ea typeface="Tahoma" pitchFamily="34" charset="0"/>
               <a:cs typeface="Tahoma" pitchFamily="34" charset="0"/>
@@ -7806,6 +7801,195 @@
               <a:ea typeface="Tahoma" pitchFamily="34" charset="0"/>
               <a:cs typeface="Tahoma" pitchFamily="34" charset="0"/>
             </a:endParaRPr>
+          </a:p>
+        </p:txBody>
+      </p:sp>
+      <p:sp>
+        <p:nvSpPr>
+          <p:cNvPr id="2" name="Rectangle 1"/>
+          <p:cNvSpPr/>
+          <p:nvPr/>
+        </p:nvSpPr>
+        <p:spPr>
+          <a:xfrm>
+            <a:off x="7776176" y="2915540"/>
+            <a:ext cx="593432" cy="307777"/>
+          </a:xfrm>
+          <a:prstGeom prst="rect">
+            <a:avLst/>
+          </a:prstGeom>
+        </p:spPr>
+        <p:txBody>
+          <a:bodyPr wrap="none">
+            <a:spAutoFit/>
+          </a:bodyPr>
+          <a:lstStyle/>
+          <a:p>
+            <a:pPr algn="ctr"/>
+            <a:r>
+              <a:rPr lang="en-US" sz="1400" b="1" u="sng" dirty="0">
+                <a:latin typeface="Tahoma" pitchFamily="34" charset="0"/>
+                <a:ea typeface="Tahoma" pitchFamily="34" charset="0"/>
+                <a:cs typeface="Tahoma" pitchFamily="34" charset="0"/>
+              </a:rPr>
+              <a:t>Now</a:t>
+            </a:r>
+            <a:endParaRPr lang="en-US" sz="1400" b="1" u="sng" dirty="0">
+              <a:latin typeface="Tahoma" pitchFamily="34" charset="0"/>
+              <a:ea typeface="Tahoma" pitchFamily="34" charset="0"/>
+              <a:cs typeface="Tahoma" pitchFamily="34" charset="0"/>
+            </a:endParaRPr>
+          </a:p>
+        </p:txBody>
+      </p:sp>
+      <p:sp>
+        <p:nvSpPr>
+          <p:cNvPr id="3" name="Oval 2"/>
+          <p:cNvSpPr/>
+          <p:nvPr/>
+        </p:nvSpPr>
+        <p:spPr>
+          <a:xfrm>
+            <a:off x="5181600" y="1767840"/>
+            <a:ext cx="81280" cy="81280"/>
+          </a:xfrm>
+          <a:prstGeom prst="ellipse">
+            <a:avLst/>
+          </a:prstGeom>
+          <a:effectLst>
+            <a:outerShdw blurRad="25400" dist="12700" dir="5400000" algn="t" rotWithShape="0">
+              <a:prstClr val="black"/>
+            </a:outerShdw>
+          </a:effectLst>
+        </p:spPr>
+        <p:style>
+          <a:lnRef idx="2">
+            <a:schemeClr val="dk1">
+              <a:shade val="50000"/>
+            </a:schemeClr>
+          </a:lnRef>
+          <a:fillRef idx="1">
+            <a:schemeClr val="dk1"/>
+          </a:fillRef>
+          <a:effectRef idx="0">
+            <a:schemeClr val="dk1"/>
+          </a:effectRef>
+          <a:fontRef idx="minor">
+            <a:schemeClr val="lt1"/>
+          </a:fontRef>
+        </p:style>
+        <p:txBody>
+          <a:bodyPr rtlCol="0" anchor="ctr"/>
+          <a:lstStyle/>
+          <a:p>
+            <a:pPr algn="ctr"/>
+            <a:endParaRPr lang="en-US"/>
+          </a:p>
+        </p:txBody>
+      </p:sp>
+      <p:sp>
+        <p:nvSpPr>
+          <p:cNvPr id="7" name="Oval 6"/>
+          <p:cNvSpPr/>
+          <p:nvPr/>
+        </p:nvSpPr>
+        <p:spPr>
+          <a:xfrm>
+            <a:off x="5481320" y="1767840"/>
+            <a:ext cx="81280" cy="81280"/>
+          </a:xfrm>
+          <a:prstGeom prst="ellipse">
+            <a:avLst/>
+          </a:prstGeom>
+          <a:solidFill>
+            <a:srgbClr val="007434"/>
+          </a:solidFill>
+          <a:ln>
+            <a:solidFill>
+              <a:srgbClr val="007635"/>
+            </a:solidFill>
+          </a:ln>
+          <a:effectLst>
+            <a:outerShdw blurRad="25400" dist="12700" dir="5400000" algn="t" rotWithShape="0">
+              <a:prstClr val="black"/>
+            </a:outerShdw>
+          </a:effectLst>
+        </p:spPr>
+        <p:style>
+          <a:lnRef idx="2">
+            <a:schemeClr val="dk1">
+              <a:shade val="50000"/>
+            </a:schemeClr>
+          </a:lnRef>
+          <a:fillRef idx="1">
+            <a:schemeClr val="dk1"/>
+          </a:fillRef>
+          <a:effectRef idx="0">
+            <a:schemeClr val="dk1"/>
+          </a:effectRef>
+          <a:fontRef idx="minor">
+            <a:schemeClr val="lt1"/>
+          </a:fontRef>
+        </p:style>
+        <p:txBody>
+          <a:bodyPr rtlCol="0" anchor="ctr"/>
+          <a:lstStyle/>
+          <a:p>
+            <a:pPr algn="ctr"/>
+            <a:endParaRPr lang="en-US"/>
+          </a:p>
+        </p:txBody>
+      </p:sp>
+      <p:sp>
+        <p:nvSpPr>
+          <p:cNvPr id="8" name="Oval 7"/>
+          <p:cNvSpPr/>
+          <p:nvPr/>
+        </p:nvSpPr>
+        <p:spPr>
+          <a:xfrm>
+            <a:off x="5781040" y="1767840"/>
+            <a:ext cx="81280" cy="81280"/>
+          </a:xfrm>
+          <a:prstGeom prst="ellipse">
+            <a:avLst/>
+          </a:prstGeom>
+          <a:solidFill>
+            <a:srgbClr val="C00000"/>
+          </a:solidFill>
+          <a:ln>
+            <a:solidFill>
+              <a:srgbClr val="C00000"/>
+            </a:solidFill>
+          </a:ln>
+          <a:effectLst>
+            <a:outerShdw blurRad="25400" dist="12700" dir="5400000" algn="t" rotWithShape="0">
+              <a:prstClr val="black"/>
+            </a:outerShdw>
+          </a:effectLst>
+        </p:spPr>
+        <p:style>
+          <a:lnRef idx="2">
+            <a:schemeClr val="dk1">
+              <a:shade val="50000"/>
+            </a:schemeClr>
+          </a:lnRef>
+          <a:fillRef idx="1">
+            <a:schemeClr val="dk1"/>
+          </a:fillRef>
+          <a:effectRef idx="0">
+            <a:schemeClr val="dk1"/>
+          </a:effectRef>
+          <a:fontRef idx="minor">
+            <a:schemeClr val="lt1"/>
+          </a:fontRef>
+        </p:style>
+        <p:txBody>
+          <a:bodyPr rtlCol="0" anchor="ctr"/>
+          <a:lstStyle/>
+          <a:p>
+            <a:pPr algn="ctr"/>
+            <a:endParaRPr lang="en-US"/>
           </a:p>
         </p:txBody>
       </p:sp>

</xml_diff>